<commit_message>
Male vs Female revised
</commit_message>
<xml_diff>
--- a/Reports/Hiwi Meeting 4.pptx
+++ b/Reports/Hiwi Meeting 4.pptx
@@ -4127,42 +4127,42 @@
                 <a:gridCol w="1074501">
                   <a:extLst>
                     <a:ext uri="{9D8B030D-6E8A-4147-A177-3AD203B41FA5}">
-                      <a16:colId xmlns="" xmlns:a16="http://schemas.microsoft.com/office/drawing/2014/main" val="20000"/>
+                      <a16:colId xmlns:a16="http://schemas.microsoft.com/office/drawing/2014/main" xmlns="" val="20000"/>
                     </a:ext>
                   </a:extLst>
                 </a:gridCol>
                 <a:gridCol w="1094563">
                   <a:extLst>
                     <a:ext uri="{9D8B030D-6E8A-4147-A177-3AD203B41FA5}">
-                      <a16:colId xmlns="" xmlns:a16="http://schemas.microsoft.com/office/drawing/2014/main" val="20001"/>
+                      <a16:colId xmlns:a16="http://schemas.microsoft.com/office/drawing/2014/main" xmlns="" val="20001"/>
                     </a:ext>
                   </a:extLst>
                 </a:gridCol>
                 <a:gridCol w="1112808">
                   <a:extLst>
                     <a:ext uri="{9D8B030D-6E8A-4147-A177-3AD203B41FA5}">
-                      <a16:colId xmlns="" xmlns:a16="http://schemas.microsoft.com/office/drawing/2014/main" val="20002"/>
+                      <a16:colId xmlns:a16="http://schemas.microsoft.com/office/drawing/2014/main" xmlns="" val="20002"/>
                     </a:ext>
                   </a:extLst>
                 </a:gridCol>
                 <a:gridCol w="785901">
                   <a:extLst>
                     <a:ext uri="{9D8B030D-6E8A-4147-A177-3AD203B41FA5}">
-                      <a16:colId xmlns="" xmlns:a16="http://schemas.microsoft.com/office/drawing/2014/main" val="20003"/>
+                      <a16:colId xmlns:a16="http://schemas.microsoft.com/office/drawing/2014/main" xmlns="" val="20003"/>
                     </a:ext>
                   </a:extLst>
                 </a:gridCol>
                 <a:gridCol w="823172">
                   <a:extLst>
                     <a:ext uri="{9D8B030D-6E8A-4147-A177-3AD203B41FA5}">
-                      <a16:colId xmlns="" xmlns:a16="http://schemas.microsoft.com/office/drawing/2014/main" val="20004"/>
+                      <a16:colId xmlns:a16="http://schemas.microsoft.com/office/drawing/2014/main" xmlns="" val="20004"/>
                     </a:ext>
                   </a:extLst>
                 </a:gridCol>
                 <a:gridCol w="1226019">
                   <a:extLst>
                     <a:ext uri="{9D8B030D-6E8A-4147-A177-3AD203B41FA5}">
-                      <a16:colId xmlns="" xmlns:a16="http://schemas.microsoft.com/office/drawing/2014/main" val="20005"/>
+                      <a16:colId xmlns:a16="http://schemas.microsoft.com/office/drawing/2014/main" xmlns="" val="20005"/>
                     </a:ext>
                   </a:extLst>
                 </a:gridCol>
@@ -4254,7 +4254,7 @@
                 </a:tc>
                 <a:extLst>
                   <a:ext uri="{0D108BD9-81ED-4DB2-BD59-A6C34878D82A}">
-                    <a16:rowId xmlns="" xmlns:a16="http://schemas.microsoft.com/office/drawing/2014/main" val="10000"/>
+                    <a16:rowId xmlns:a16="http://schemas.microsoft.com/office/drawing/2014/main" xmlns="" val="10000"/>
                   </a:ext>
                 </a:extLst>
               </a:tr>
@@ -4351,7 +4351,7 @@
                 </a:tc>
                 <a:extLst>
                   <a:ext uri="{0D108BD9-81ED-4DB2-BD59-A6C34878D82A}">
-                    <a16:rowId xmlns="" xmlns:a16="http://schemas.microsoft.com/office/drawing/2014/main" val="10001"/>
+                    <a16:rowId xmlns:a16="http://schemas.microsoft.com/office/drawing/2014/main" xmlns="" val="10001"/>
                   </a:ext>
                 </a:extLst>
               </a:tr>
@@ -4509,7 +4509,7 @@
                 </a:tc>
                 <a:extLst>
                   <a:ext uri="{0D108BD9-81ED-4DB2-BD59-A6C34878D82A}">
-                    <a16:rowId xmlns="" xmlns:a16="http://schemas.microsoft.com/office/drawing/2014/main" val="10002"/>
+                    <a16:rowId xmlns:a16="http://schemas.microsoft.com/office/drawing/2014/main" xmlns="" val="10002"/>
                   </a:ext>
                 </a:extLst>
               </a:tr>
@@ -4652,7 +4652,7 @@
                 </a:tc>
                 <a:extLst>
                   <a:ext uri="{0D108BD9-81ED-4DB2-BD59-A6C34878D82A}">
-                    <a16:rowId xmlns="" xmlns:a16="http://schemas.microsoft.com/office/drawing/2014/main" val="10003"/>
+                    <a16:rowId xmlns:a16="http://schemas.microsoft.com/office/drawing/2014/main" xmlns="" val="10003"/>
                   </a:ext>
                 </a:extLst>
               </a:tr>
@@ -4753,7 +4753,7 @@
                 </a:tc>
                 <a:extLst>
                   <a:ext uri="{0D108BD9-81ED-4DB2-BD59-A6C34878D82A}">
-                    <a16:rowId xmlns="" xmlns:a16="http://schemas.microsoft.com/office/drawing/2014/main" val="10004"/>
+                    <a16:rowId xmlns:a16="http://schemas.microsoft.com/office/drawing/2014/main" xmlns="" val="10004"/>
                   </a:ext>
                 </a:extLst>
               </a:tr>
@@ -4854,7 +4854,7 @@
                 </a:tc>
                 <a:extLst>
                   <a:ext uri="{0D108BD9-81ED-4DB2-BD59-A6C34878D82A}">
-                    <a16:rowId xmlns="" xmlns:a16="http://schemas.microsoft.com/office/drawing/2014/main" val="10005"/>
+                    <a16:rowId xmlns:a16="http://schemas.microsoft.com/office/drawing/2014/main" xmlns="" val="10005"/>
                   </a:ext>
                 </a:extLst>
               </a:tr>
@@ -4945,42 +4945,42 @@
                 <a:gridCol w="1074501">
                   <a:extLst>
                     <a:ext uri="{9D8B030D-6E8A-4147-A177-3AD203B41FA5}">
-                      <a16:colId xmlns="" xmlns:a16="http://schemas.microsoft.com/office/drawing/2014/main" val="20000"/>
+                      <a16:colId xmlns:a16="http://schemas.microsoft.com/office/drawing/2014/main" xmlns="" val="20000"/>
                     </a:ext>
                   </a:extLst>
                 </a:gridCol>
                 <a:gridCol w="1042804">
                   <a:extLst>
                     <a:ext uri="{9D8B030D-6E8A-4147-A177-3AD203B41FA5}">
-                      <a16:colId xmlns="" xmlns:a16="http://schemas.microsoft.com/office/drawing/2014/main" val="20001"/>
+                      <a16:colId xmlns:a16="http://schemas.microsoft.com/office/drawing/2014/main" xmlns="" val="20001"/>
                     </a:ext>
                   </a:extLst>
                 </a:gridCol>
                 <a:gridCol w="1086929">
                   <a:extLst>
                     <a:ext uri="{9D8B030D-6E8A-4147-A177-3AD203B41FA5}">
-                      <a16:colId xmlns="" xmlns:a16="http://schemas.microsoft.com/office/drawing/2014/main" val="20002"/>
+                      <a16:colId xmlns:a16="http://schemas.microsoft.com/office/drawing/2014/main" xmlns="" val="20002"/>
                     </a:ext>
                   </a:extLst>
                 </a:gridCol>
                 <a:gridCol w="777436">
                   <a:extLst>
                     <a:ext uri="{9D8B030D-6E8A-4147-A177-3AD203B41FA5}">
-                      <a16:colId xmlns="" xmlns:a16="http://schemas.microsoft.com/office/drawing/2014/main" val="20003"/>
+                      <a16:colId xmlns:a16="http://schemas.microsoft.com/office/drawing/2014/main" xmlns="" val="20003"/>
                     </a:ext>
                   </a:extLst>
                 </a:gridCol>
                 <a:gridCol w="909275">
                   <a:extLst>
                     <a:ext uri="{9D8B030D-6E8A-4147-A177-3AD203B41FA5}">
-                      <a16:colId xmlns="" xmlns:a16="http://schemas.microsoft.com/office/drawing/2014/main" val="20004"/>
+                      <a16:colId xmlns:a16="http://schemas.microsoft.com/office/drawing/2014/main" xmlns="" val="20004"/>
                     </a:ext>
                   </a:extLst>
                 </a:gridCol>
                 <a:gridCol w="1226019">
                   <a:extLst>
                     <a:ext uri="{9D8B030D-6E8A-4147-A177-3AD203B41FA5}">
-                      <a16:colId xmlns="" xmlns:a16="http://schemas.microsoft.com/office/drawing/2014/main" val="20005"/>
+                      <a16:colId xmlns:a16="http://schemas.microsoft.com/office/drawing/2014/main" xmlns="" val="20005"/>
                     </a:ext>
                   </a:extLst>
                 </a:gridCol>
@@ -5072,7 +5072,7 @@
                 </a:tc>
                 <a:extLst>
                   <a:ext uri="{0D108BD9-81ED-4DB2-BD59-A6C34878D82A}">
-                    <a16:rowId xmlns="" xmlns:a16="http://schemas.microsoft.com/office/drawing/2014/main" val="10000"/>
+                    <a16:rowId xmlns:a16="http://schemas.microsoft.com/office/drawing/2014/main" xmlns="" val="10000"/>
                   </a:ext>
                 </a:extLst>
               </a:tr>
@@ -5169,7 +5169,7 @@
                 </a:tc>
                 <a:extLst>
                   <a:ext uri="{0D108BD9-81ED-4DB2-BD59-A6C34878D82A}">
-                    <a16:rowId xmlns="" xmlns:a16="http://schemas.microsoft.com/office/drawing/2014/main" val="10001"/>
+                    <a16:rowId xmlns:a16="http://schemas.microsoft.com/office/drawing/2014/main" xmlns="" val="10001"/>
                   </a:ext>
                 </a:extLst>
               </a:tr>
@@ -5329,7 +5329,7 @@
                 </a:tc>
                 <a:extLst>
                   <a:ext uri="{0D108BD9-81ED-4DB2-BD59-A6C34878D82A}">
-                    <a16:rowId xmlns="" xmlns:a16="http://schemas.microsoft.com/office/drawing/2014/main" val="10002"/>
+                    <a16:rowId xmlns:a16="http://schemas.microsoft.com/office/drawing/2014/main" xmlns="" val="10002"/>
                   </a:ext>
                 </a:extLst>
               </a:tr>
@@ -5489,7 +5489,7 @@
                 </a:tc>
                 <a:extLst>
                   <a:ext uri="{0D108BD9-81ED-4DB2-BD59-A6C34878D82A}">
-                    <a16:rowId xmlns="" xmlns:a16="http://schemas.microsoft.com/office/drawing/2014/main" val="10003"/>
+                    <a16:rowId xmlns:a16="http://schemas.microsoft.com/office/drawing/2014/main" xmlns="" val="10003"/>
                   </a:ext>
                 </a:extLst>
               </a:tr>
@@ -5632,7 +5632,7 @@
                 </a:tc>
                 <a:extLst>
                   <a:ext uri="{0D108BD9-81ED-4DB2-BD59-A6C34878D82A}">
-                    <a16:rowId xmlns="" xmlns:a16="http://schemas.microsoft.com/office/drawing/2014/main" val="10004"/>
+                    <a16:rowId xmlns:a16="http://schemas.microsoft.com/office/drawing/2014/main" xmlns="" val="10004"/>
                   </a:ext>
                 </a:extLst>
               </a:tr>
@@ -5733,7 +5733,7 @@
                 </a:tc>
                 <a:extLst>
                   <a:ext uri="{0D108BD9-81ED-4DB2-BD59-A6C34878D82A}">
-                    <a16:rowId xmlns="" xmlns:a16="http://schemas.microsoft.com/office/drawing/2014/main" val="10005"/>
+                    <a16:rowId xmlns:a16="http://schemas.microsoft.com/office/drawing/2014/main" xmlns="" val="10005"/>
                   </a:ext>
                 </a:extLst>
               </a:tr>
@@ -5824,42 +5824,42 @@
                 <a:gridCol w="1074501">
                   <a:extLst>
                     <a:ext uri="{9D8B030D-6E8A-4147-A177-3AD203B41FA5}">
-                      <a16:colId xmlns="" xmlns:a16="http://schemas.microsoft.com/office/drawing/2014/main" val="20000"/>
+                      <a16:colId xmlns:a16="http://schemas.microsoft.com/office/drawing/2014/main" xmlns="" val="20000"/>
                     </a:ext>
                   </a:extLst>
                 </a:gridCol>
                 <a:gridCol w="1051431">
                   <a:extLst>
                     <a:ext uri="{9D8B030D-6E8A-4147-A177-3AD203B41FA5}">
-                      <a16:colId xmlns="" xmlns:a16="http://schemas.microsoft.com/office/drawing/2014/main" val="20001"/>
+                      <a16:colId xmlns:a16="http://schemas.microsoft.com/office/drawing/2014/main" xmlns="" val="20001"/>
                     </a:ext>
                   </a:extLst>
                 </a:gridCol>
                 <a:gridCol w="1104181">
                   <a:extLst>
                     <a:ext uri="{9D8B030D-6E8A-4147-A177-3AD203B41FA5}">
-                      <a16:colId xmlns="" xmlns:a16="http://schemas.microsoft.com/office/drawing/2014/main" val="20002"/>
+                      <a16:colId xmlns:a16="http://schemas.microsoft.com/office/drawing/2014/main" xmlns="" val="20002"/>
                     </a:ext>
                   </a:extLst>
                 </a:gridCol>
                 <a:gridCol w="751557">
                   <a:extLst>
                     <a:ext uri="{9D8B030D-6E8A-4147-A177-3AD203B41FA5}">
-                      <a16:colId xmlns="" xmlns:a16="http://schemas.microsoft.com/office/drawing/2014/main" val="20003"/>
+                      <a16:colId xmlns:a16="http://schemas.microsoft.com/office/drawing/2014/main" xmlns="" val="20003"/>
                     </a:ext>
                   </a:extLst>
                 </a:gridCol>
                 <a:gridCol w="909275">
                   <a:extLst>
                     <a:ext uri="{9D8B030D-6E8A-4147-A177-3AD203B41FA5}">
-                      <a16:colId xmlns="" xmlns:a16="http://schemas.microsoft.com/office/drawing/2014/main" val="20004"/>
+                      <a16:colId xmlns:a16="http://schemas.microsoft.com/office/drawing/2014/main" xmlns="" val="20004"/>
                     </a:ext>
                   </a:extLst>
                 </a:gridCol>
                 <a:gridCol w="1226019">
                   <a:extLst>
                     <a:ext uri="{9D8B030D-6E8A-4147-A177-3AD203B41FA5}">
-                      <a16:colId xmlns="" xmlns:a16="http://schemas.microsoft.com/office/drawing/2014/main" val="20005"/>
+                      <a16:colId xmlns:a16="http://schemas.microsoft.com/office/drawing/2014/main" xmlns="" val="20005"/>
                     </a:ext>
                   </a:extLst>
                 </a:gridCol>
@@ -5951,7 +5951,7 @@
                 </a:tc>
                 <a:extLst>
                   <a:ext uri="{0D108BD9-81ED-4DB2-BD59-A6C34878D82A}">
-                    <a16:rowId xmlns="" xmlns:a16="http://schemas.microsoft.com/office/drawing/2014/main" val="10000"/>
+                    <a16:rowId xmlns:a16="http://schemas.microsoft.com/office/drawing/2014/main" xmlns="" val="10000"/>
                   </a:ext>
                 </a:extLst>
               </a:tr>
@@ -6046,7 +6046,7 @@
                 </a:tc>
                 <a:extLst>
                   <a:ext uri="{0D108BD9-81ED-4DB2-BD59-A6C34878D82A}">
-                    <a16:rowId xmlns="" xmlns:a16="http://schemas.microsoft.com/office/drawing/2014/main" val="10001"/>
+                    <a16:rowId xmlns:a16="http://schemas.microsoft.com/office/drawing/2014/main" xmlns="" val="10001"/>
                   </a:ext>
                 </a:extLst>
               </a:tr>
@@ -6202,7 +6202,7 @@
                 </a:tc>
                 <a:extLst>
                   <a:ext uri="{0D108BD9-81ED-4DB2-BD59-A6C34878D82A}">
-                    <a16:rowId xmlns="" xmlns:a16="http://schemas.microsoft.com/office/drawing/2014/main" val="10002"/>
+                    <a16:rowId xmlns:a16="http://schemas.microsoft.com/office/drawing/2014/main" xmlns="" val="10002"/>
                   </a:ext>
                 </a:extLst>
               </a:tr>
@@ -6358,7 +6358,7 @@
                 </a:tc>
                 <a:extLst>
                   <a:ext uri="{0D108BD9-81ED-4DB2-BD59-A6C34878D82A}">
-                    <a16:rowId xmlns="" xmlns:a16="http://schemas.microsoft.com/office/drawing/2014/main" val="10003"/>
+                    <a16:rowId xmlns:a16="http://schemas.microsoft.com/office/drawing/2014/main" xmlns="" val="10003"/>
                   </a:ext>
                 </a:extLst>
               </a:tr>
@@ -6491,7 +6491,7 @@
                 </a:tc>
                 <a:extLst>
                   <a:ext uri="{0D108BD9-81ED-4DB2-BD59-A6C34878D82A}">
-                    <a16:rowId xmlns="" xmlns:a16="http://schemas.microsoft.com/office/drawing/2014/main" val="10004"/>
+                    <a16:rowId xmlns:a16="http://schemas.microsoft.com/office/drawing/2014/main" xmlns="" val="10004"/>
                   </a:ext>
                 </a:extLst>
               </a:tr>
@@ -6582,7 +6582,7 @@
                 </a:tc>
                 <a:extLst>
                   <a:ext uri="{0D108BD9-81ED-4DB2-BD59-A6C34878D82A}">
-                    <a16:rowId xmlns="" xmlns:a16="http://schemas.microsoft.com/office/drawing/2014/main" val="10005"/>
+                    <a16:rowId xmlns:a16="http://schemas.microsoft.com/office/drawing/2014/main" xmlns="" val="10005"/>
                   </a:ext>
                 </a:extLst>
               </a:tr>
@@ -9110,42 +9110,42 @@
                 <a:gridCol w="1024621">
                   <a:extLst>
                     <a:ext uri="{9D8B030D-6E8A-4147-A177-3AD203B41FA5}">
-                      <a16:colId xmlns="" xmlns:a16="http://schemas.microsoft.com/office/drawing/2014/main" val="20000"/>
+                      <a16:colId xmlns:a16="http://schemas.microsoft.com/office/drawing/2014/main" xmlns="" val="20000"/>
                     </a:ext>
                   </a:extLst>
                 </a:gridCol>
                 <a:gridCol w="1232949">
                   <a:extLst>
                     <a:ext uri="{9D8B030D-6E8A-4147-A177-3AD203B41FA5}">
-                      <a16:colId xmlns="" xmlns:a16="http://schemas.microsoft.com/office/drawing/2014/main" val="20001"/>
+                      <a16:colId xmlns:a16="http://schemas.microsoft.com/office/drawing/2014/main" xmlns="" val="20001"/>
                     </a:ext>
                   </a:extLst>
                 </a:gridCol>
                 <a:gridCol w="1069375">
                   <a:extLst>
                     <a:ext uri="{9D8B030D-6E8A-4147-A177-3AD203B41FA5}">
-                      <a16:colId xmlns="" xmlns:a16="http://schemas.microsoft.com/office/drawing/2014/main" val="20002"/>
+                      <a16:colId xmlns:a16="http://schemas.microsoft.com/office/drawing/2014/main" xmlns="" val="20002"/>
                     </a:ext>
                   </a:extLst>
                 </a:gridCol>
                 <a:gridCol w="765014">
                   <a:extLst>
                     <a:ext uri="{9D8B030D-6E8A-4147-A177-3AD203B41FA5}">
-                      <a16:colId xmlns="" xmlns:a16="http://schemas.microsoft.com/office/drawing/2014/main" val="20003"/>
+                      <a16:colId xmlns:a16="http://schemas.microsoft.com/office/drawing/2014/main" xmlns="" val="20003"/>
                     </a:ext>
                   </a:extLst>
                 </a:gridCol>
                 <a:gridCol w="847274">
                   <a:extLst>
                     <a:ext uri="{9D8B030D-6E8A-4147-A177-3AD203B41FA5}">
-                      <a16:colId xmlns="" xmlns:a16="http://schemas.microsoft.com/office/drawing/2014/main" val="20004"/>
+                      <a16:colId xmlns:a16="http://schemas.microsoft.com/office/drawing/2014/main" xmlns="" val="20004"/>
                     </a:ext>
                   </a:extLst>
                 </a:gridCol>
                 <a:gridCol w="987114">
                   <a:extLst>
                     <a:ext uri="{9D8B030D-6E8A-4147-A177-3AD203B41FA5}">
-                      <a16:colId xmlns="" xmlns:a16="http://schemas.microsoft.com/office/drawing/2014/main" val="20005"/>
+                      <a16:colId xmlns:a16="http://schemas.microsoft.com/office/drawing/2014/main" xmlns="" val="20005"/>
                     </a:ext>
                   </a:extLst>
                 </a:gridCol>
@@ -9237,7 +9237,7 @@
                 </a:tc>
                 <a:extLst>
                   <a:ext uri="{0D108BD9-81ED-4DB2-BD59-A6C34878D82A}">
-                    <a16:rowId xmlns="" xmlns:a16="http://schemas.microsoft.com/office/drawing/2014/main" val="10000"/>
+                    <a16:rowId xmlns:a16="http://schemas.microsoft.com/office/drawing/2014/main" xmlns="" val="10000"/>
                   </a:ext>
                 </a:extLst>
               </a:tr>
@@ -9334,7 +9334,7 @@
                 </a:tc>
                 <a:extLst>
                   <a:ext uri="{0D108BD9-81ED-4DB2-BD59-A6C34878D82A}">
-                    <a16:rowId xmlns="" xmlns:a16="http://schemas.microsoft.com/office/drawing/2014/main" val="10001"/>
+                    <a16:rowId xmlns:a16="http://schemas.microsoft.com/office/drawing/2014/main" xmlns="" val="10001"/>
                   </a:ext>
                 </a:extLst>
               </a:tr>
@@ -9502,7 +9502,7 @@
                 </a:tc>
                 <a:extLst>
                   <a:ext uri="{0D108BD9-81ED-4DB2-BD59-A6C34878D82A}">
-                    <a16:rowId xmlns="" xmlns:a16="http://schemas.microsoft.com/office/drawing/2014/main" val="10002"/>
+                    <a16:rowId xmlns:a16="http://schemas.microsoft.com/office/drawing/2014/main" xmlns="" val="10002"/>
                   </a:ext>
                 </a:extLst>
               </a:tr>
@@ -9643,7 +9643,7 @@
                 </a:tc>
                 <a:extLst>
                   <a:ext uri="{0D108BD9-81ED-4DB2-BD59-A6C34878D82A}">
-                    <a16:rowId xmlns="" xmlns:a16="http://schemas.microsoft.com/office/drawing/2014/main" val="10003"/>
+                    <a16:rowId xmlns:a16="http://schemas.microsoft.com/office/drawing/2014/main" xmlns="" val="10003"/>
                   </a:ext>
                 </a:extLst>
               </a:tr>
@@ -9798,7 +9798,7 @@
                 </a:tc>
                 <a:extLst>
                   <a:ext uri="{0D108BD9-81ED-4DB2-BD59-A6C34878D82A}">
-                    <a16:rowId xmlns="" xmlns:a16="http://schemas.microsoft.com/office/drawing/2014/main" val="10004"/>
+                    <a16:rowId xmlns:a16="http://schemas.microsoft.com/office/drawing/2014/main" xmlns="" val="10004"/>
                   </a:ext>
                 </a:extLst>
               </a:tr>
@@ -9939,7 +9939,7 @@
                 </a:tc>
                 <a:extLst>
                   <a:ext uri="{0D108BD9-81ED-4DB2-BD59-A6C34878D82A}">
-                    <a16:rowId xmlns="" xmlns:a16="http://schemas.microsoft.com/office/drawing/2014/main" val="10005"/>
+                    <a16:rowId xmlns:a16="http://schemas.microsoft.com/office/drawing/2014/main" xmlns="" val="10005"/>
                   </a:ext>
                 </a:extLst>
               </a:tr>
@@ -10030,42 +10030,42 @@
                 <a:gridCol w="1031399">
                   <a:extLst>
                     <a:ext uri="{9D8B030D-6E8A-4147-A177-3AD203B41FA5}">
-                      <a16:colId xmlns="" xmlns:a16="http://schemas.microsoft.com/office/drawing/2014/main" val="20000"/>
+                      <a16:colId xmlns:a16="http://schemas.microsoft.com/office/drawing/2014/main" xmlns="" val="20000"/>
                     </a:ext>
                   </a:extLst>
                 </a:gridCol>
                 <a:gridCol w="1092058">
                   <a:extLst>
                     <a:ext uri="{9D8B030D-6E8A-4147-A177-3AD203B41FA5}">
-                      <a16:colId xmlns="" xmlns:a16="http://schemas.microsoft.com/office/drawing/2014/main" val="20001"/>
+                      <a16:colId xmlns:a16="http://schemas.microsoft.com/office/drawing/2014/main" xmlns="" val="20001"/>
                     </a:ext>
                   </a:extLst>
                 </a:gridCol>
                 <a:gridCol w="1043327">
                   <a:extLst>
                     <a:ext uri="{9D8B030D-6E8A-4147-A177-3AD203B41FA5}">
-                      <a16:colId xmlns="" xmlns:a16="http://schemas.microsoft.com/office/drawing/2014/main" val="20002"/>
+                      <a16:colId xmlns:a16="http://schemas.microsoft.com/office/drawing/2014/main" xmlns="" val="20002"/>
                     </a:ext>
                   </a:extLst>
                 </a:gridCol>
                 <a:gridCol w="852879">
                   <a:extLst>
                     <a:ext uri="{9D8B030D-6E8A-4147-A177-3AD203B41FA5}">
-                      <a16:colId xmlns="" xmlns:a16="http://schemas.microsoft.com/office/drawing/2014/main" val="20003"/>
+                      <a16:colId xmlns:a16="http://schemas.microsoft.com/office/drawing/2014/main" xmlns="" val="20003"/>
                     </a:ext>
                   </a:extLst>
                 </a:gridCol>
                 <a:gridCol w="778356">
                   <a:extLst>
                     <a:ext uri="{9D8B030D-6E8A-4147-A177-3AD203B41FA5}">
-                      <a16:colId xmlns="" xmlns:a16="http://schemas.microsoft.com/office/drawing/2014/main" val="20004"/>
+                      <a16:colId xmlns:a16="http://schemas.microsoft.com/office/drawing/2014/main" xmlns="" val="20004"/>
                     </a:ext>
                   </a:extLst>
                 </a:gridCol>
                 <a:gridCol w="1073572">
                   <a:extLst>
                     <a:ext uri="{9D8B030D-6E8A-4147-A177-3AD203B41FA5}">
-                      <a16:colId xmlns="" xmlns:a16="http://schemas.microsoft.com/office/drawing/2014/main" val="20005"/>
+                      <a16:colId xmlns:a16="http://schemas.microsoft.com/office/drawing/2014/main" xmlns="" val="20005"/>
                     </a:ext>
                   </a:extLst>
                 </a:gridCol>
@@ -10157,7 +10157,7 @@
                 </a:tc>
                 <a:extLst>
                   <a:ext uri="{0D108BD9-81ED-4DB2-BD59-A6C34878D82A}">
-                    <a16:rowId xmlns="" xmlns:a16="http://schemas.microsoft.com/office/drawing/2014/main" val="10000"/>
+                    <a16:rowId xmlns:a16="http://schemas.microsoft.com/office/drawing/2014/main" xmlns="" val="10000"/>
                   </a:ext>
                 </a:extLst>
               </a:tr>
@@ -10256,7 +10256,7 @@
                 </a:tc>
                 <a:extLst>
                   <a:ext uri="{0D108BD9-81ED-4DB2-BD59-A6C34878D82A}">
-                    <a16:rowId xmlns="" xmlns:a16="http://schemas.microsoft.com/office/drawing/2014/main" val="10001"/>
+                    <a16:rowId xmlns:a16="http://schemas.microsoft.com/office/drawing/2014/main" xmlns="" val="10001"/>
                   </a:ext>
                 </a:extLst>
               </a:tr>
@@ -10416,7 +10416,7 @@
                 </a:tc>
                 <a:extLst>
                   <a:ext uri="{0D108BD9-81ED-4DB2-BD59-A6C34878D82A}">
-                    <a16:rowId xmlns="" xmlns:a16="http://schemas.microsoft.com/office/drawing/2014/main" val="10002"/>
+                    <a16:rowId xmlns:a16="http://schemas.microsoft.com/office/drawing/2014/main" xmlns="" val="10002"/>
                   </a:ext>
                 </a:extLst>
               </a:tr>
@@ -10557,7 +10557,7 @@
                 </a:tc>
                 <a:extLst>
                   <a:ext uri="{0D108BD9-81ED-4DB2-BD59-A6C34878D82A}">
-                    <a16:rowId xmlns="" xmlns:a16="http://schemas.microsoft.com/office/drawing/2014/main" val="10003"/>
+                    <a16:rowId xmlns:a16="http://schemas.microsoft.com/office/drawing/2014/main" xmlns="" val="10003"/>
                   </a:ext>
                 </a:extLst>
               </a:tr>
@@ -10698,7 +10698,7 @@
                 </a:tc>
                 <a:extLst>
                   <a:ext uri="{0D108BD9-81ED-4DB2-BD59-A6C34878D82A}">
-                    <a16:rowId xmlns="" xmlns:a16="http://schemas.microsoft.com/office/drawing/2014/main" val="10004"/>
+                    <a16:rowId xmlns:a16="http://schemas.microsoft.com/office/drawing/2014/main" xmlns="" val="10004"/>
                   </a:ext>
                 </a:extLst>
               </a:tr>
@@ -10799,7 +10799,7 @@
                 </a:tc>
                 <a:extLst>
                   <a:ext uri="{0D108BD9-81ED-4DB2-BD59-A6C34878D82A}">
-                    <a16:rowId xmlns="" xmlns:a16="http://schemas.microsoft.com/office/drawing/2014/main" val="10005"/>
+                    <a16:rowId xmlns:a16="http://schemas.microsoft.com/office/drawing/2014/main" xmlns="" val="10005"/>
                   </a:ext>
                 </a:extLst>
               </a:tr>
@@ -10890,42 +10890,42 @@
                 <a:gridCol w="1074501">
                   <a:extLst>
                     <a:ext uri="{9D8B030D-6E8A-4147-A177-3AD203B41FA5}">
-                      <a16:colId xmlns="" xmlns:a16="http://schemas.microsoft.com/office/drawing/2014/main" val="20000"/>
+                      <a16:colId xmlns:a16="http://schemas.microsoft.com/office/drawing/2014/main" xmlns="" val="20000"/>
                     </a:ext>
                   </a:extLst>
                 </a:gridCol>
                 <a:gridCol w="1361982">
                   <a:extLst>
                     <a:ext uri="{9D8B030D-6E8A-4147-A177-3AD203B41FA5}">
-                      <a16:colId xmlns="" xmlns:a16="http://schemas.microsoft.com/office/drawing/2014/main" val="20001"/>
+                      <a16:colId xmlns:a16="http://schemas.microsoft.com/office/drawing/2014/main" xmlns="" val="20001"/>
                     </a:ext>
                   </a:extLst>
                 </a:gridCol>
                 <a:gridCol w="1069675">
                   <a:extLst>
                     <a:ext uri="{9D8B030D-6E8A-4147-A177-3AD203B41FA5}">
-                      <a16:colId xmlns="" xmlns:a16="http://schemas.microsoft.com/office/drawing/2014/main" val="20002"/>
+                      <a16:colId xmlns:a16="http://schemas.microsoft.com/office/drawing/2014/main" xmlns="" val="20002"/>
                     </a:ext>
                   </a:extLst>
                 </a:gridCol>
                 <a:gridCol w="776378">
                   <a:extLst>
                     <a:ext uri="{9D8B030D-6E8A-4147-A177-3AD203B41FA5}">
-                      <a16:colId xmlns="" xmlns:a16="http://schemas.microsoft.com/office/drawing/2014/main" val="20003"/>
+                      <a16:colId xmlns:a16="http://schemas.microsoft.com/office/drawing/2014/main" xmlns="" val="20003"/>
                     </a:ext>
                   </a:extLst>
                 </a:gridCol>
                 <a:gridCol w="785004">
                   <a:extLst>
                     <a:ext uri="{9D8B030D-6E8A-4147-A177-3AD203B41FA5}">
-                      <a16:colId xmlns="" xmlns:a16="http://schemas.microsoft.com/office/drawing/2014/main" val="20004"/>
+                      <a16:colId xmlns:a16="http://schemas.microsoft.com/office/drawing/2014/main" xmlns="" val="20004"/>
                     </a:ext>
                   </a:extLst>
                 </a:gridCol>
                 <a:gridCol w="1049424">
                   <a:extLst>
                     <a:ext uri="{9D8B030D-6E8A-4147-A177-3AD203B41FA5}">
-                      <a16:colId xmlns="" xmlns:a16="http://schemas.microsoft.com/office/drawing/2014/main" val="20005"/>
+                      <a16:colId xmlns:a16="http://schemas.microsoft.com/office/drawing/2014/main" xmlns="" val="20005"/>
                     </a:ext>
                   </a:extLst>
                 </a:gridCol>
@@ -11017,7 +11017,7 @@
                 </a:tc>
                 <a:extLst>
                   <a:ext uri="{0D108BD9-81ED-4DB2-BD59-A6C34878D82A}">
-                    <a16:rowId xmlns="" xmlns:a16="http://schemas.microsoft.com/office/drawing/2014/main" val="10000"/>
+                    <a16:rowId xmlns:a16="http://schemas.microsoft.com/office/drawing/2014/main" xmlns="" val="10000"/>
                   </a:ext>
                 </a:extLst>
               </a:tr>
@@ -11116,7 +11116,7 @@
                 </a:tc>
                 <a:extLst>
                   <a:ext uri="{0D108BD9-81ED-4DB2-BD59-A6C34878D82A}">
-                    <a16:rowId xmlns="" xmlns:a16="http://schemas.microsoft.com/office/drawing/2014/main" val="10001"/>
+                    <a16:rowId xmlns:a16="http://schemas.microsoft.com/office/drawing/2014/main" xmlns="" val="10001"/>
                   </a:ext>
                 </a:extLst>
               </a:tr>
@@ -11272,7 +11272,7 @@
                 </a:tc>
                 <a:extLst>
                   <a:ext uri="{0D108BD9-81ED-4DB2-BD59-A6C34878D82A}">
-                    <a16:rowId xmlns="" xmlns:a16="http://schemas.microsoft.com/office/drawing/2014/main" val="10002"/>
+                    <a16:rowId xmlns:a16="http://schemas.microsoft.com/office/drawing/2014/main" xmlns="" val="10002"/>
                   </a:ext>
                 </a:extLst>
               </a:tr>
@@ -11413,7 +11413,7 @@
                 </a:tc>
                 <a:extLst>
                   <a:ext uri="{0D108BD9-81ED-4DB2-BD59-A6C34878D82A}">
-                    <a16:rowId xmlns="" xmlns:a16="http://schemas.microsoft.com/office/drawing/2014/main" val="10003"/>
+                    <a16:rowId xmlns:a16="http://schemas.microsoft.com/office/drawing/2014/main" xmlns="" val="10003"/>
                   </a:ext>
                 </a:extLst>
               </a:tr>
@@ -11552,7 +11552,7 @@
                 </a:tc>
                 <a:extLst>
                   <a:ext uri="{0D108BD9-81ED-4DB2-BD59-A6C34878D82A}">
-                    <a16:rowId xmlns="" xmlns:a16="http://schemas.microsoft.com/office/drawing/2014/main" val="10004"/>
+                    <a16:rowId xmlns:a16="http://schemas.microsoft.com/office/drawing/2014/main" xmlns="" val="10004"/>
                   </a:ext>
                 </a:extLst>
               </a:tr>
@@ -11651,7 +11651,7 @@
                 </a:tc>
                 <a:extLst>
                   <a:ext uri="{0D108BD9-81ED-4DB2-BD59-A6C34878D82A}">
-                    <a16:rowId xmlns="" xmlns:a16="http://schemas.microsoft.com/office/drawing/2014/main" val="10005"/>
+                    <a16:rowId xmlns:a16="http://schemas.microsoft.com/office/drawing/2014/main" xmlns="" val="10005"/>
                   </a:ext>
                 </a:extLst>
               </a:tr>
@@ -11742,42 +11742,42 @@
                 <a:gridCol w="1074501">
                   <a:extLst>
                     <a:ext uri="{9D8B030D-6E8A-4147-A177-3AD203B41FA5}">
-                      <a16:colId xmlns="" xmlns:a16="http://schemas.microsoft.com/office/drawing/2014/main" val="20000"/>
+                      <a16:colId xmlns:a16="http://schemas.microsoft.com/office/drawing/2014/main" xmlns="" val="20000"/>
                     </a:ext>
                   </a:extLst>
                 </a:gridCol>
                 <a:gridCol w="1094563">
                   <a:extLst>
                     <a:ext uri="{9D8B030D-6E8A-4147-A177-3AD203B41FA5}">
-                      <a16:colId xmlns="" xmlns:a16="http://schemas.microsoft.com/office/drawing/2014/main" val="20001"/>
+                      <a16:colId xmlns:a16="http://schemas.microsoft.com/office/drawing/2014/main" xmlns="" val="20001"/>
                     </a:ext>
                   </a:extLst>
                 </a:gridCol>
                 <a:gridCol w="1112808">
                   <a:extLst>
                     <a:ext uri="{9D8B030D-6E8A-4147-A177-3AD203B41FA5}">
-                      <a16:colId xmlns="" xmlns:a16="http://schemas.microsoft.com/office/drawing/2014/main" val="20002"/>
+                      <a16:colId xmlns:a16="http://schemas.microsoft.com/office/drawing/2014/main" xmlns="" val="20002"/>
                     </a:ext>
                   </a:extLst>
                 </a:gridCol>
                 <a:gridCol w="755968">
                   <a:extLst>
                     <a:ext uri="{9D8B030D-6E8A-4147-A177-3AD203B41FA5}">
-                      <a16:colId xmlns="" xmlns:a16="http://schemas.microsoft.com/office/drawing/2014/main" val="20003"/>
+                      <a16:colId xmlns:a16="http://schemas.microsoft.com/office/drawing/2014/main" xmlns="" val="20003"/>
                     </a:ext>
                   </a:extLst>
                 </a:gridCol>
                 <a:gridCol w="909275">
                   <a:extLst>
                     <a:ext uri="{9D8B030D-6E8A-4147-A177-3AD203B41FA5}">
-                      <a16:colId xmlns="" xmlns:a16="http://schemas.microsoft.com/office/drawing/2014/main" val="20004"/>
+                      <a16:colId xmlns:a16="http://schemas.microsoft.com/office/drawing/2014/main" xmlns="" val="20004"/>
                     </a:ext>
                   </a:extLst>
                 </a:gridCol>
                 <a:gridCol w="1226019">
                   <a:extLst>
                     <a:ext uri="{9D8B030D-6E8A-4147-A177-3AD203B41FA5}">
-                      <a16:colId xmlns="" xmlns:a16="http://schemas.microsoft.com/office/drawing/2014/main" val="20005"/>
+                      <a16:colId xmlns:a16="http://schemas.microsoft.com/office/drawing/2014/main" xmlns="" val="20005"/>
                     </a:ext>
                   </a:extLst>
                 </a:gridCol>
@@ -11869,7 +11869,7 @@
                 </a:tc>
                 <a:extLst>
                   <a:ext uri="{0D108BD9-81ED-4DB2-BD59-A6C34878D82A}">
-                    <a16:rowId xmlns="" xmlns:a16="http://schemas.microsoft.com/office/drawing/2014/main" val="10000"/>
+                    <a16:rowId xmlns:a16="http://schemas.microsoft.com/office/drawing/2014/main" xmlns="" val="10000"/>
                   </a:ext>
                 </a:extLst>
               </a:tr>
@@ -11968,7 +11968,7 @@
                 </a:tc>
                 <a:extLst>
                   <a:ext uri="{0D108BD9-81ED-4DB2-BD59-A6C34878D82A}">
-                    <a16:rowId xmlns="" xmlns:a16="http://schemas.microsoft.com/office/drawing/2014/main" val="10001"/>
+                    <a16:rowId xmlns:a16="http://schemas.microsoft.com/office/drawing/2014/main" xmlns="" val="10001"/>
                   </a:ext>
                 </a:extLst>
               </a:tr>
@@ -12126,7 +12126,7 @@
                 </a:tc>
                 <a:extLst>
                   <a:ext uri="{0D108BD9-81ED-4DB2-BD59-A6C34878D82A}">
-                    <a16:rowId xmlns="" xmlns:a16="http://schemas.microsoft.com/office/drawing/2014/main" val="10002"/>
+                    <a16:rowId xmlns:a16="http://schemas.microsoft.com/office/drawing/2014/main" xmlns="" val="10002"/>
                   </a:ext>
                 </a:extLst>
               </a:tr>
@@ -12286,7 +12286,7 @@
                 </a:tc>
                 <a:extLst>
                   <a:ext uri="{0D108BD9-81ED-4DB2-BD59-A6C34878D82A}">
-                    <a16:rowId xmlns="" xmlns:a16="http://schemas.microsoft.com/office/drawing/2014/main" val="10003"/>
+                    <a16:rowId xmlns:a16="http://schemas.microsoft.com/office/drawing/2014/main" xmlns="" val="10003"/>
                   </a:ext>
                 </a:extLst>
               </a:tr>
@@ -12427,7 +12427,7 @@
                 </a:tc>
                 <a:extLst>
                   <a:ext uri="{0D108BD9-81ED-4DB2-BD59-A6C34878D82A}">
-                    <a16:rowId xmlns="" xmlns:a16="http://schemas.microsoft.com/office/drawing/2014/main" val="10004"/>
+                    <a16:rowId xmlns:a16="http://schemas.microsoft.com/office/drawing/2014/main" xmlns="" val="10004"/>
                   </a:ext>
                 </a:extLst>
               </a:tr>
@@ -12540,7 +12540,7 @@
                 </a:tc>
                 <a:extLst>
                   <a:ext uri="{0D108BD9-81ED-4DB2-BD59-A6C34878D82A}">
-                    <a16:rowId xmlns="" xmlns:a16="http://schemas.microsoft.com/office/drawing/2014/main" val="10005"/>
+                    <a16:rowId xmlns:a16="http://schemas.microsoft.com/office/drawing/2014/main" xmlns="" val="10005"/>
                   </a:ext>
                 </a:extLst>
               </a:tr>
@@ -12631,42 +12631,42 @@
                 <a:gridCol w="1108522">
                   <a:extLst>
                     <a:ext uri="{9D8B030D-6E8A-4147-A177-3AD203B41FA5}">
-                      <a16:colId xmlns="" xmlns:a16="http://schemas.microsoft.com/office/drawing/2014/main" val="20000"/>
+                      <a16:colId xmlns:a16="http://schemas.microsoft.com/office/drawing/2014/main" xmlns="" val="20000"/>
                     </a:ext>
                   </a:extLst>
                 </a:gridCol>
                 <a:gridCol w="1129219">
                   <a:extLst>
                     <a:ext uri="{9D8B030D-6E8A-4147-A177-3AD203B41FA5}">
-                      <a16:colId xmlns="" xmlns:a16="http://schemas.microsoft.com/office/drawing/2014/main" val="20001"/>
+                      <a16:colId xmlns:a16="http://schemas.microsoft.com/office/drawing/2014/main" xmlns="" val="20001"/>
                     </a:ext>
                   </a:extLst>
                 </a:gridCol>
                 <a:gridCol w="1148042">
                   <a:extLst>
                     <a:ext uri="{9D8B030D-6E8A-4147-A177-3AD203B41FA5}">
-                      <a16:colId xmlns="" xmlns:a16="http://schemas.microsoft.com/office/drawing/2014/main" val="20002"/>
+                      <a16:colId xmlns:a16="http://schemas.microsoft.com/office/drawing/2014/main" xmlns="" val="20002"/>
                     </a:ext>
                   </a:extLst>
                 </a:gridCol>
                 <a:gridCol w="802761">
                   <a:extLst>
                     <a:ext uri="{9D8B030D-6E8A-4147-A177-3AD203B41FA5}">
-                      <a16:colId xmlns="" xmlns:a16="http://schemas.microsoft.com/office/drawing/2014/main" val="20003"/>
+                      <a16:colId xmlns:a16="http://schemas.microsoft.com/office/drawing/2014/main" xmlns="" val="20003"/>
                     </a:ext>
                   </a:extLst>
                 </a:gridCol>
                 <a:gridCol w="857259">
                   <a:extLst>
                     <a:ext uri="{9D8B030D-6E8A-4147-A177-3AD203B41FA5}">
-                      <a16:colId xmlns="" xmlns:a16="http://schemas.microsoft.com/office/drawing/2014/main" val="20004"/>
+                      <a16:colId xmlns:a16="http://schemas.microsoft.com/office/drawing/2014/main" xmlns="" val="20004"/>
                     </a:ext>
                   </a:extLst>
                 </a:gridCol>
                 <a:gridCol w="1264838">
                   <a:extLst>
                     <a:ext uri="{9D8B030D-6E8A-4147-A177-3AD203B41FA5}">
-                      <a16:colId xmlns="" xmlns:a16="http://schemas.microsoft.com/office/drawing/2014/main" val="20005"/>
+                      <a16:colId xmlns:a16="http://schemas.microsoft.com/office/drawing/2014/main" xmlns="" val="20005"/>
                     </a:ext>
                   </a:extLst>
                 </a:gridCol>
@@ -12758,7 +12758,7 @@
                 </a:tc>
                 <a:extLst>
                   <a:ext uri="{0D108BD9-81ED-4DB2-BD59-A6C34878D82A}">
-                    <a16:rowId xmlns="" xmlns:a16="http://schemas.microsoft.com/office/drawing/2014/main" val="10000"/>
+                    <a16:rowId xmlns:a16="http://schemas.microsoft.com/office/drawing/2014/main" xmlns="" val="10000"/>
                   </a:ext>
                 </a:extLst>
               </a:tr>
@@ -12899,7 +12899,7 @@
                 </a:tc>
                 <a:extLst>
                   <a:ext uri="{0D108BD9-81ED-4DB2-BD59-A6C34878D82A}">
-                    <a16:rowId xmlns="" xmlns:a16="http://schemas.microsoft.com/office/drawing/2014/main" val="10001"/>
+                    <a16:rowId xmlns:a16="http://schemas.microsoft.com/office/drawing/2014/main" xmlns="" val="10001"/>
                   </a:ext>
                 </a:extLst>
               </a:tr>
@@ -13057,7 +13057,7 @@
                 </a:tc>
                 <a:extLst>
                   <a:ext uri="{0D108BD9-81ED-4DB2-BD59-A6C34878D82A}">
-                    <a16:rowId xmlns="" xmlns:a16="http://schemas.microsoft.com/office/drawing/2014/main" val="10002"/>
+                    <a16:rowId xmlns:a16="http://schemas.microsoft.com/office/drawing/2014/main" xmlns="" val="10002"/>
                   </a:ext>
                 </a:extLst>
               </a:tr>
@@ -13198,7 +13198,7 @@
                 </a:tc>
                 <a:extLst>
                   <a:ext uri="{0D108BD9-81ED-4DB2-BD59-A6C34878D82A}">
-                    <a16:rowId xmlns="" xmlns:a16="http://schemas.microsoft.com/office/drawing/2014/main" val="10003"/>
+                    <a16:rowId xmlns:a16="http://schemas.microsoft.com/office/drawing/2014/main" xmlns="" val="10003"/>
                   </a:ext>
                 </a:extLst>
               </a:tr>
@@ -13373,7 +13373,7 @@
                 </a:tc>
                 <a:extLst>
                   <a:ext uri="{0D108BD9-81ED-4DB2-BD59-A6C34878D82A}">
-                    <a16:rowId xmlns="" xmlns:a16="http://schemas.microsoft.com/office/drawing/2014/main" val="10004"/>
+                    <a16:rowId xmlns:a16="http://schemas.microsoft.com/office/drawing/2014/main" xmlns="" val="10004"/>
                   </a:ext>
                 </a:extLst>
               </a:tr>
@@ -13514,7 +13514,7 @@
                 </a:tc>
                 <a:extLst>
                   <a:ext uri="{0D108BD9-81ED-4DB2-BD59-A6C34878D82A}">
-                    <a16:rowId xmlns="" xmlns:a16="http://schemas.microsoft.com/office/drawing/2014/main" val="10005"/>
+                    <a16:rowId xmlns:a16="http://schemas.microsoft.com/office/drawing/2014/main" xmlns="" val="10005"/>
                   </a:ext>
                 </a:extLst>
               </a:tr>
@@ -13605,42 +13605,42 @@
                 <a:gridCol w="1074501">
                   <a:extLst>
                     <a:ext uri="{9D8B030D-6E8A-4147-A177-3AD203B41FA5}">
-                      <a16:colId xmlns="" xmlns:a16="http://schemas.microsoft.com/office/drawing/2014/main" val="20000"/>
+                      <a16:colId xmlns:a16="http://schemas.microsoft.com/office/drawing/2014/main" xmlns="" val="20000"/>
                     </a:ext>
                   </a:extLst>
                 </a:gridCol>
                 <a:gridCol w="1094563">
                   <a:extLst>
                     <a:ext uri="{9D8B030D-6E8A-4147-A177-3AD203B41FA5}">
-                      <a16:colId xmlns="" xmlns:a16="http://schemas.microsoft.com/office/drawing/2014/main" val="20001"/>
+                      <a16:colId xmlns:a16="http://schemas.microsoft.com/office/drawing/2014/main" xmlns="" val="20001"/>
                     </a:ext>
                   </a:extLst>
                 </a:gridCol>
                 <a:gridCol w="1112808">
                   <a:extLst>
                     <a:ext uri="{9D8B030D-6E8A-4147-A177-3AD203B41FA5}">
-                      <a16:colId xmlns="" xmlns:a16="http://schemas.microsoft.com/office/drawing/2014/main" val="20002"/>
+                      <a16:colId xmlns:a16="http://schemas.microsoft.com/office/drawing/2014/main" xmlns="" val="20002"/>
                     </a:ext>
                   </a:extLst>
                 </a:gridCol>
                 <a:gridCol w="785901">
                   <a:extLst>
                     <a:ext uri="{9D8B030D-6E8A-4147-A177-3AD203B41FA5}">
-                      <a16:colId xmlns="" xmlns:a16="http://schemas.microsoft.com/office/drawing/2014/main" val="20003"/>
+                      <a16:colId xmlns:a16="http://schemas.microsoft.com/office/drawing/2014/main" xmlns="" val="20003"/>
                     </a:ext>
                   </a:extLst>
                 </a:gridCol>
                 <a:gridCol w="823172">
                   <a:extLst>
                     <a:ext uri="{9D8B030D-6E8A-4147-A177-3AD203B41FA5}">
-                      <a16:colId xmlns="" xmlns:a16="http://schemas.microsoft.com/office/drawing/2014/main" val="20004"/>
+                      <a16:colId xmlns:a16="http://schemas.microsoft.com/office/drawing/2014/main" xmlns="" val="20004"/>
                     </a:ext>
                   </a:extLst>
                 </a:gridCol>
                 <a:gridCol w="1226019">
                   <a:extLst>
                     <a:ext uri="{9D8B030D-6E8A-4147-A177-3AD203B41FA5}">
-                      <a16:colId xmlns="" xmlns:a16="http://schemas.microsoft.com/office/drawing/2014/main" val="20005"/>
+                      <a16:colId xmlns:a16="http://schemas.microsoft.com/office/drawing/2014/main" xmlns="" val="20005"/>
                     </a:ext>
                   </a:extLst>
                 </a:gridCol>
@@ -13732,7 +13732,7 @@
                 </a:tc>
                 <a:extLst>
                   <a:ext uri="{0D108BD9-81ED-4DB2-BD59-A6C34878D82A}">
-                    <a16:rowId xmlns="" xmlns:a16="http://schemas.microsoft.com/office/drawing/2014/main" val="10000"/>
+                    <a16:rowId xmlns:a16="http://schemas.microsoft.com/office/drawing/2014/main" xmlns="" val="10000"/>
                   </a:ext>
                 </a:extLst>
               </a:tr>
@@ -13873,7 +13873,7 @@
                 </a:tc>
                 <a:extLst>
                   <a:ext uri="{0D108BD9-81ED-4DB2-BD59-A6C34878D82A}">
-                    <a16:rowId xmlns="" xmlns:a16="http://schemas.microsoft.com/office/drawing/2014/main" val="10001"/>
+                    <a16:rowId xmlns:a16="http://schemas.microsoft.com/office/drawing/2014/main" xmlns="" val="10001"/>
                   </a:ext>
                 </a:extLst>
               </a:tr>
@@ -14029,7 +14029,7 @@
                 </a:tc>
                 <a:extLst>
                   <a:ext uri="{0D108BD9-81ED-4DB2-BD59-A6C34878D82A}">
-                    <a16:rowId xmlns="" xmlns:a16="http://schemas.microsoft.com/office/drawing/2014/main" val="10002"/>
+                    <a16:rowId xmlns:a16="http://schemas.microsoft.com/office/drawing/2014/main" xmlns="" val="10002"/>
                   </a:ext>
                 </a:extLst>
               </a:tr>
@@ -14168,7 +14168,7 @@
                 </a:tc>
                 <a:extLst>
                   <a:ext uri="{0D108BD9-81ED-4DB2-BD59-A6C34878D82A}">
-                    <a16:rowId xmlns="" xmlns:a16="http://schemas.microsoft.com/office/drawing/2014/main" val="10003"/>
+                    <a16:rowId xmlns:a16="http://schemas.microsoft.com/office/drawing/2014/main" xmlns="" val="10003"/>
                   </a:ext>
                 </a:extLst>
               </a:tr>
@@ -14324,7 +14324,7 @@
                 </a:tc>
                 <a:extLst>
                   <a:ext uri="{0D108BD9-81ED-4DB2-BD59-A6C34878D82A}">
-                    <a16:rowId xmlns="" xmlns:a16="http://schemas.microsoft.com/office/drawing/2014/main" val="10004"/>
+                    <a16:rowId xmlns:a16="http://schemas.microsoft.com/office/drawing/2014/main" xmlns="" val="10004"/>
                   </a:ext>
                 </a:extLst>
               </a:tr>
@@ -14467,7 +14467,7 @@
                 </a:tc>
                 <a:extLst>
                   <a:ext uri="{0D108BD9-81ED-4DB2-BD59-A6C34878D82A}">
-                    <a16:rowId xmlns="" xmlns:a16="http://schemas.microsoft.com/office/drawing/2014/main" val="10005"/>
+                    <a16:rowId xmlns:a16="http://schemas.microsoft.com/office/drawing/2014/main" xmlns="" val="10005"/>
                   </a:ext>
                 </a:extLst>
               </a:tr>
@@ -14650,42 +14650,42 @@
                 <a:gridCol w="1074501">
                   <a:extLst>
                     <a:ext uri="{9D8B030D-6E8A-4147-A177-3AD203B41FA5}">
-                      <a16:colId xmlns="" xmlns:a16="http://schemas.microsoft.com/office/drawing/2014/main" val="20000"/>
+                      <a16:colId xmlns:a16="http://schemas.microsoft.com/office/drawing/2014/main" xmlns="" val="20000"/>
                     </a:ext>
                   </a:extLst>
                 </a:gridCol>
                 <a:gridCol w="1042804">
                   <a:extLst>
                     <a:ext uri="{9D8B030D-6E8A-4147-A177-3AD203B41FA5}">
-                      <a16:colId xmlns="" xmlns:a16="http://schemas.microsoft.com/office/drawing/2014/main" val="20001"/>
+                      <a16:colId xmlns:a16="http://schemas.microsoft.com/office/drawing/2014/main" xmlns="" val="20001"/>
                     </a:ext>
                   </a:extLst>
                 </a:gridCol>
                 <a:gridCol w="1086929">
                   <a:extLst>
                     <a:ext uri="{9D8B030D-6E8A-4147-A177-3AD203B41FA5}">
-                      <a16:colId xmlns="" xmlns:a16="http://schemas.microsoft.com/office/drawing/2014/main" val="20002"/>
+                      <a16:colId xmlns:a16="http://schemas.microsoft.com/office/drawing/2014/main" xmlns="" val="20002"/>
                     </a:ext>
                   </a:extLst>
                 </a:gridCol>
                 <a:gridCol w="777436">
                   <a:extLst>
                     <a:ext uri="{9D8B030D-6E8A-4147-A177-3AD203B41FA5}">
-                      <a16:colId xmlns="" xmlns:a16="http://schemas.microsoft.com/office/drawing/2014/main" val="20003"/>
+                      <a16:colId xmlns:a16="http://schemas.microsoft.com/office/drawing/2014/main" xmlns="" val="20003"/>
                     </a:ext>
                   </a:extLst>
                 </a:gridCol>
                 <a:gridCol w="909275">
                   <a:extLst>
                     <a:ext uri="{9D8B030D-6E8A-4147-A177-3AD203B41FA5}">
-                      <a16:colId xmlns="" xmlns:a16="http://schemas.microsoft.com/office/drawing/2014/main" val="20004"/>
+                      <a16:colId xmlns:a16="http://schemas.microsoft.com/office/drawing/2014/main" xmlns="" val="20004"/>
                     </a:ext>
                   </a:extLst>
                 </a:gridCol>
                 <a:gridCol w="1226019">
                   <a:extLst>
                     <a:ext uri="{9D8B030D-6E8A-4147-A177-3AD203B41FA5}">
-                      <a16:colId xmlns="" xmlns:a16="http://schemas.microsoft.com/office/drawing/2014/main" val="20005"/>
+                      <a16:colId xmlns:a16="http://schemas.microsoft.com/office/drawing/2014/main" xmlns="" val="20005"/>
                     </a:ext>
                   </a:extLst>
                 </a:gridCol>
@@ -14777,7 +14777,7 @@
                 </a:tc>
                 <a:extLst>
                   <a:ext uri="{0D108BD9-81ED-4DB2-BD59-A6C34878D82A}">
-                    <a16:rowId xmlns="" xmlns:a16="http://schemas.microsoft.com/office/drawing/2014/main" val="10000"/>
+                    <a16:rowId xmlns:a16="http://schemas.microsoft.com/office/drawing/2014/main" xmlns="" val="10000"/>
                   </a:ext>
                 </a:extLst>
               </a:tr>
@@ -14878,7 +14878,7 @@
                 </a:tc>
                 <a:extLst>
                   <a:ext uri="{0D108BD9-81ED-4DB2-BD59-A6C34878D82A}">
-                    <a16:rowId xmlns="" xmlns:a16="http://schemas.microsoft.com/office/drawing/2014/main" val="10001"/>
+                    <a16:rowId xmlns:a16="http://schemas.microsoft.com/office/drawing/2014/main" xmlns="" val="10001"/>
                   </a:ext>
                 </a:extLst>
               </a:tr>
@@ -15068,7 +15068,7 @@
                 </a:tc>
                 <a:extLst>
                   <a:ext uri="{0D108BD9-81ED-4DB2-BD59-A6C34878D82A}">
-                    <a16:rowId xmlns="" xmlns:a16="http://schemas.microsoft.com/office/drawing/2014/main" val="10002"/>
+                    <a16:rowId xmlns:a16="http://schemas.microsoft.com/office/drawing/2014/main" xmlns="" val="10002"/>
                   </a:ext>
                 </a:extLst>
               </a:tr>
@@ -15207,7 +15207,7 @@
                 </a:tc>
                 <a:extLst>
                   <a:ext uri="{0D108BD9-81ED-4DB2-BD59-A6C34878D82A}">
-                    <a16:rowId xmlns="" xmlns:a16="http://schemas.microsoft.com/office/drawing/2014/main" val="10003"/>
+                    <a16:rowId xmlns:a16="http://schemas.microsoft.com/office/drawing/2014/main" xmlns="" val="10003"/>
                   </a:ext>
                 </a:extLst>
               </a:tr>
@@ -15340,7 +15340,7 @@
                 </a:tc>
                 <a:extLst>
                   <a:ext uri="{0D108BD9-81ED-4DB2-BD59-A6C34878D82A}">
-                    <a16:rowId xmlns="" xmlns:a16="http://schemas.microsoft.com/office/drawing/2014/main" val="10004"/>
+                    <a16:rowId xmlns:a16="http://schemas.microsoft.com/office/drawing/2014/main" xmlns="" val="10004"/>
                   </a:ext>
                 </a:extLst>
               </a:tr>
@@ -15481,7 +15481,7 @@
                 </a:tc>
                 <a:extLst>
                   <a:ext uri="{0D108BD9-81ED-4DB2-BD59-A6C34878D82A}">
-                    <a16:rowId xmlns="" xmlns:a16="http://schemas.microsoft.com/office/drawing/2014/main" val="10005"/>
+                    <a16:rowId xmlns:a16="http://schemas.microsoft.com/office/drawing/2014/main" xmlns="" val="10005"/>
                   </a:ext>
                 </a:extLst>
               </a:tr>
@@ -15572,42 +15572,42 @@
                 <a:gridCol w="1074501">
                   <a:extLst>
                     <a:ext uri="{9D8B030D-6E8A-4147-A177-3AD203B41FA5}">
-                      <a16:colId xmlns="" xmlns:a16="http://schemas.microsoft.com/office/drawing/2014/main" val="20000"/>
+                      <a16:colId xmlns:a16="http://schemas.microsoft.com/office/drawing/2014/main" xmlns="" val="20000"/>
                     </a:ext>
                   </a:extLst>
                 </a:gridCol>
                 <a:gridCol w="1051431">
                   <a:extLst>
                     <a:ext uri="{9D8B030D-6E8A-4147-A177-3AD203B41FA5}">
-                      <a16:colId xmlns="" xmlns:a16="http://schemas.microsoft.com/office/drawing/2014/main" val="20001"/>
+                      <a16:colId xmlns:a16="http://schemas.microsoft.com/office/drawing/2014/main" xmlns="" val="20001"/>
                     </a:ext>
                   </a:extLst>
                 </a:gridCol>
                 <a:gridCol w="1104181">
                   <a:extLst>
                     <a:ext uri="{9D8B030D-6E8A-4147-A177-3AD203B41FA5}">
-                      <a16:colId xmlns="" xmlns:a16="http://schemas.microsoft.com/office/drawing/2014/main" val="20002"/>
+                      <a16:colId xmlns:a16="http://schemas.microsoft.com/office/drawing/2014/main" xmlns="" val="20002"/>
                     </a:ext>
                   </a:extLst>
                 </a:gridCol>
                 <a:gridCol w="751557">
                   <a:extLst>
                     <a:ext uri="{9D8B030D-6E8A-4147-A177-3AD203B41FA5}">
-                      <a16:colId xmlns="" xmlns:a16="http://schemas.microsoft.com/office/drawing/2014/main" val="20003"/>
+                      <a16:colId xmlns:a16="http://schemas.microsoft.com/office/drawing/2014/main" xmlns="" val="20003"/>
                     </a:ext>
                   </a:extLst>
                 </a:gridCol>
                 <a:gridCol w="909275">
                   <a:extLst>
                     <a:ext uri="{9D8B030D-6E8A-4147-A177-3AD203B41FA5}">
-                      <a16:colId xmlns="" xmlns:a16="http://schemas.microsoft.com/office/drawing/2014/main" val="20004"/>
+                      <a16:colId xmlns:a16="http://schemas.microsoft.com/office/drawing/2014/main" xmlns="" val="20004"/>
                     </a:ext>
                   </a:extLst>
                 </a:gridCol>
                 <a:gridCol w="1226019">
                   <a:extLst>
                     <a:ext uri="{9D8B030D-6E8A-4147-A177-3AD203B41FA5}">
-                      <a16:colId xmlns="" xmlns:a16="http://schemas.microsoft.com/office/drawing/2014/main" val="20005"/>
+                      <a16:colId xmlns:a16="http://schemas.microsoft.com/office/drawing/2014/main" xmlns="" val="20005"/>
                     </a:ext>
                   </a:extLst>
                 </a:gridCol>
@@ -15699,7 +15699,7 @@
                 </a:tc>
                 <a:extLst>
                   <a:ext uri="{0D108BD9-81ED-4DB2-BD59-A6C34878D82A}">
-                    <a16:rowId xmlns="" xmlns:a16="http://schemas.microsoft.com/office/drawing/2014/main" val="10000"/>
+                    <a16:rowId xmlns:a16="http://schemas.microsoft.com/office/drawing/2014/main" xmlns="" val="10000"/>
                   </a:ext>
                 </a:extLst>
               </a:tr>
@@ -15838,7 +15838,7 @@
                 </a:tc>
                 <a:extLst>
                   <a:ext uri="{0D108BD9-81ED-4DB2-BD59-A6C34878D82A}">
-                    <a16:rowId xmlns="" xmlns:a16="http://schemas.microsoft.com/office/drawing/2014/main" val="10001"/>
+                    <a16:rowId xmlns:a16="http://schemas.microsoft.com/office/drawing/2014/main" xmlns="" val="10001"/>
                   </a:ext>
                 </a:extLst>
               </a:tr>
@@ -15994,7 +15994,7 @@
                 </a:tc>
                 <a:extLst>
                   <a:ext uri="{0D108BD9-81ED-4DB2-BD59-A6C34878D82A}">
-                    <a16:rowId xmlns="" xmlns:a16="http://schemas.microsoft.com/office/drawing/2014/main" val="10002"/>
+                    <a16:rowId xmlns:a16="http://schemas.microsoft.com/office/drawing/2014/main" xmlns="" val="10002"/>
                   </a:ext>
                 </a:extLst>
               </a:tr>
@@ -16133,7 +16133,7 @@
                 </a:tc>
                 <a:extLst>
                   <a:ext uri="{0D108BD9-81ED-4DB2-BD59-A6C34878D82A}">
-                    <a16:rowId xmlns="" xmlns:a16="http://schemas.microsoft.com/office/drawing/2014/main" val="10003"/>
+                    <a16:rowId xmlns:a16="http://schemas.microsoft.com/office/drawing/2014/main" xmlns="" val="10003"/>
                   </a:ext>
                 </a:extLst>
               </a:tr>
@@ -16289,7 +16289,7 @@
                 </a:tc>
                 <a:extLst>
                   <a:ext uri="{0D108BD9-81ED-4DB2-BD59-A6C34878D82A}">
-                    <a16:rowId xmlns="" xmlns:a16="http://schemas.microsoft.com/office/drawing/2014/main" val="10004"/>
+                    <a16:rowId xmlns:a16="http://schemas.microsoft.com/office/drawing/2014/main" xmlns="" val="10004"/>
                   </a:ext>
                 </a:extLst>
               </a:tr>
@@ -16428,7 +16428,7 @@
                 </a:tc>
                 <a:extLst>
                   <a:ext uri="{0D108BD9-81ED-4DB2-BD59-A6C34878D82A}">
-                    <a16:rowId xmlns="" xmlns:a16="http://schemas.microsoft.com/office/drawing/2014/main" val="10005"/>
+                    <a16:rowId xmlns:a16="http://schemas.microsoft.com/office/drawing/2014/main" xmlns="" val="10005"/>
                   </a:ext>
                 </a:extLst>
               </a:tr>
@@ -18186,7 +18186,7 @@
           <p:nvPr>
             <p:extLst>
               <p:ext uri="{D42A27DB-BD31-4B8C-83A1-F6EECF244321}">
-                <p14:modId xmlns:p14="http://schemas.microsoft.com/office/powerpoint/2010/main" val="2749693778"/>
+                <p14:modId xmlns:p14="http://schemas.microsoft.com/office/powerpoint/2010/main" val="2673376899"/>
               </p:ext>
             </p:extLst>
           </p:nvPr>
@@ -18205,42 +18205,42 @@
                 <a:gridCol w="1024621">
                   <a:extLst>
                     <a:ext uri="{9D8B030D-6E8A-4147-A177-3AD203B41FA5}">
-                      <a16:colId xmlns="" xmlns:a16="http://schemas.microsoft.com/office/drawing/2014/main" val="20000"/>
+                      <a16:colId xmlns:a16="http://schemas.microsoft.com/office/drawing/2014/main" xmlns="" val="20000"/>
                     </a:ext>
                   </a:extLst>
                 </a:gridCol>
                 <a:gridCol w="1232949">
                   <a:extLst>
                     <a:ext uri="{9D8B030D-6E8A-4147-A177-3AD203B41FA5}">
-                      <a16:colId xmlns="" xmlns:a16="http://schemas.microsoft.com/office/drawing/2014/main" val="20001"/>
+                      <a16:colId xmlns:a16="http://schemas.microsoft.com/office/drawing/2014/main" xmlns="" val="20001"/>
                     </a:ext>
                   </a:extLst>
                 </a:gridCol>
                 <a:gridCol w="1069375">
                   <a:extLst>
                     <a:ext uri="{9D8B030D-6E8A-4147-A177-3AD203B41FA5}">
-                      <a16:colId xmlns="" xmlns:a16="http://schemas.microsoft.com/office/drawing/2014/main" val="20002"/>
+                      <a16:colId xmlns:a16="http://schemas.microsoft.com/office/drawing/2014/main" xmlns="" val="20002"/>
                     </a:ext>
                   </a:extLst>
                 </a:gridCol>
                 <a:gridCol w="765014">
                   <a:extLst>
                     <a:ext uri="{9D8B030D-6E8A-4147-A177-3AD203B41FA5}">
-                      <a16:colId xmlns="" xmlns:a16="http://schemas.microsoft.com/office/drawing/2014/main" val="20003"/>
+                      <a16:colId xmlns:a16="http://schemas.microsoft.com/office/drawing/2014/main" xmlns="" val="20003"/>
                     </a:ext>
                   </a:extLst>
                 </a:gridCol>
                 <a:gridCol w="847274">
                   <a:extLst>
                     <a:ext uri="{9D8B030D-6E8A-4147-A177-3AD203B41FA5}">
-                      <a16:colId xmlns="" xmlns:a16="http://schemas.microsoft.com/office/drawing/2014/main" val="20004"/>
+                      <a16:colId xmlns:a16="http://schemas.microsoft.com/office/drawing/2014/main" xmlns="" val="20004"/>
                     </a:ext>
                   </a:extLst>
                 </a:gridCol>
                 <a:gridCol w="987114">
                   <a:extLst>
                     <a:ext uri="{9D8B030D-6E8A-4147-A177-3AD203B41FA5}">
-                      <a16:colId xmlns="" xmlns:a16="http://schemas.microsoft.com/office/drawing/2014/main" val="20005"/>
+                      <a16:colId xmlns:a16="http://schemas.microsoft.com/office/drawing/2014/main" xmlns="" val="20005"/>
                     </a:ext>
                   </a:extLst>
                 </a:gridCol>
@@ -18332,7 +18332,7 @@
                 </a:tc>
                 <a:extLst>
                   <a:ext uri="{0D108BD9-81ED-4DB2-BD59-A6C34878D82A}">
-                    <a16:rowId xmlns="" xmlns:a16="http://schemas.microsoft.com/office/drawing/2014/main" val="10000"/>
+                    <a16:rowId xmlns:a16="http://schemas.microsoft.com/office/drawing/2014/main" xmlns="" val="10000"/>
                   </a:ext>
                 </a:extLst>
               </a:tr>
@@ -18357,56 +18357,56 @@
                     <a:lstStyle/>
                     <a:p>
                       <a:r>
-                        <a:rPr lang="en-IN" dirty="0"/>
-                        <a:t>3</a:t>
-                      </a:r>
-                      <a:endParaRPr lang="en-GB" dirty="0"/>
-                    </a:p>
-                  </a:txBody>
-                  <a:tcPr/>
-                </a:tc>
-                <a:tc>
-                  <a:txBody>
-                    <a:bodyPr/>
-                    <a:lstStyle/>
-                    <a:p>
-                      <a:r>
-                        <a:rPr lang="en-GB" dirty="0">
-                          <a:effectLst/>
-                        </a:rPr>
-                        <a:t>0.500</a:t>
-                      </a:r>
-                      <a:endParaRPr lang="en-GB" dirty="0"/>
-                    </a:p>
-                  </a:txBody>
-                  <a:tcPr/>
-                </a:tc>
-                <a:tc>
-                  <a:txBody>
-                    <a:bodyPr/>
-                    <a:lstStyle/>
-                    <a:p>
-                      <a:r>
-                        <a:rPr lang="en-GB" dirty="0">
-                          <a:effectLst/>
-                        </a:rPr>
-                        <a:t>0.500</a:t>
-                      </a:r>
-                      <a:endParaRPr lang="en-GB" dirty="0"/>
-                    </a:p>
-                  </a:txBody>
-                  <a:tcPr/>
-                </a:tc>
-                <a:tc>
-                  <a:txBody>
-                    <a:bodyPr/>
-                    <a:lstStyle/>
-                    <a:p>
-                      <a:r>
-                        <a:rPr lang="en-GB" dirty="0">
-                          <a:effectLst/>
-                        </a:rPr>
-                        <a:t>0.000</a:t>
+                        <a:rPr lang="en-IN" dirty="0" smtClean="0"/>
+                        <a:t>8</a:t>
+                      </a:r>
+                      <a:endParaRPr lang="en-GB" dirty="0"/>
+                    </a:p>
+                  </a:txBody>
+                  <a:tcPr/>
+                </a:tc>
+                <a:tc>
+                  <a:txBody>
+                    <a:bodyPr/>
+                    <a:lstStyle/>
+                    <a:p>
+                      <a:r>
+                        <a:rPr lang="en-GB" dirty="0" smtClean="0">
+                          <a:effectLst/>
+                        </a:rPr>
+                        <a:t>0.307</a:t>
+                      </a:r>
+                      <a:endParaRPr lang="en-GB" dirty="0"/>
+                    </a:p>
+                  </a:txBody>
+                  <a:tcPr/>
+                </a:tc>
+                <a:tc>
+                  <a:txBody>
+                    <a:bodyPr/>
+                    <a:lstStyle/>
+                    <a:p>
+                      <a:r>
+                        <a:rPr lang="en-GB" dirty="0" smtClean="0">
+                          <a:effectLst/>
+                        </a:rPr>
+                        <a:t>0.308</a:t>
+                      </a:r>
+                      <a:endParaRPr lang="en-GB" dirty="0"/>
+                    </a:p>
+                  </a:txBody>
+                  <a:tcPr/>
+                </a:tc>
+                <a:tc>
+                  <a:txBody>
+                    <a:bodyPr/>
+                    <a:lstStyle/>
+                    <a:p>
+                      <a:r>
+                        <a:rPr lang="en-GB" dirty="0" smtClean="0">
+                          <a:effectLst/>
+                        </a:rPr>
+                        <a:t>-0.384</a:t>
                       </a:r>
                       <a:endParaRPr lang="en-GB" dirty="0"/>
                     </a:p>
@@ -18429,7 +18429,7 @@
                 </a:tc>
                 <a:extLst>
                   <a:ext uri="{0D108BD9-81ED-4DB2-BD59-A6C34878D82A}">
-                    <a16:rowId xmlns="" xmlns:a16="http://schemas.microsoft.com/office/drawing/2014/main" val="10001"/>
+                    <a16:rowId xmlns:a16="http://schemas.microsoft.com/office/drawing/2014/main" xmlns="" val="10001"/>
                   </a:ext>
                 </a:extLst>
               </a:tr>
@@ -18587,7 +18587,7 @@
                 </a:tc>
                 <a:extLst>
                   <a:ext uri="{0D108BD9-81ED-4DB2-BD59-A6C34878D82A}">
-                    <a16:rowId xmlns="" xmlns:a16="http://schemas.microsoft.com/office/drawing/2014/main" val="10002"/>
+                    <a16:rowId xmlns:a16="http://schemas.microsoft.com/office/drawing/2014/main" xmlns="" val="10002"/>
                   </a:ext>
                 </a:extLst>
               </a:tr>
@@ -18732,7 +18732,7 @@
                 </a:tc>
                 <a:extLst>
                   <a:ext uri="{0D108BD9-81ED-4DB2-BD59-A6C34878D82A}">
-                    <a16:rowId xmlns="" xmlns:a16="http://schemas.microsoft.com/office/drawing/2014/main" val="10003"/>
+                    <a16:rowId xmlns:a16="http://schemas.microsoft.com/office/drawing/2014/main" xmlns="" val="10003"/>
                   </a:ext>
                 </a:extLst>
               </a:tr>
@@ -18890,7 +18890,7 @@
                 </a:tc>
                 <a:extLst>
                   <a:ext uri="{0D108BD9-81ED-4DB2-BD59-A6C34878D82A}">
-                    <a16:rowId xmlns="" xmlns:a16="http://schemas.microsoft.com/office/drawing/2014/main" val="10004"/>
+                    <a16:rowId xmlns:a16="http://schemas.microsoft.com/office/drawing/2014/main" xmlns="" val="10004"/>
                   </a:ext>
                 </a:extLst>
               </a:tr>
@@ -19029,7 +19029,7 @@
                 </a:tc>
                 <a:extLst>
                   <a:ext uri="{0D108BD9-81ED-4DB2-BD59-A6C34878D82A}">
-                    <a16:rowId xmlns="" xmlns:a16="http://schemas.microsoft.com/office/drawing/2014/main" val="10005"/>
+                    <a16:rowId xmlns:a16="http://schemas.microsoft.com/office/drawing/2014/main" xmlns="" val="10005"/>
                   </a:ext>
                 </a:extLst>
               </a:tr>
@@ -19168,7 +19168,7 @@
           <p:nvPr>
             <p:extLst>
               <p:ext uri="{D42A27DB-BD31-4B8C-83A1-F6EECF244321}">
-                <p14:modId xmlns:p14="http://schemas.microsoft.com/office/powerpoint/2010/main" val="3652360527"/>
+                <p14:modId xmlns:p14="http://schemas.microsoft.com/office/powerpoint/2010/main" val="2444716220"/>
               </p:ext>
             </p:extLst>
           </p:nvPr>
@@ -19187,42 +19187,42 @@
                 <a:gridCol w="1126267">
                   <a:extLst>
                     <a:ext uri="{9D8B030D-6E8A-4147-A177-3AD203B41FA5}">
-                      <a16:colId xmlns="" xmlns:a16="http://schemas.microsoft.com/office/drawing/2014/main" val="20000"/>
+                      <a16:colId xmlns:a16="http://schemas.microsoft.com/office/drawing/2014/main" xmlns="" val="20000"/>
                     </a:ext>
                   </a:extLst>
                 </a:gridCol>
                 <a:gridCol w="1192506">
                   <a:extLst>
                     <a:ext uri="{9D8B030D-6E8A-4147-A177-3AD203B41FA5}">
-                      <a16:colId xmlns="" xmlns:a16="http://schemas.microsoft.com/office/drawing/2014/main" val="20001"/>
+                      <a16:colId xmlns:a16="http://schemas.microsoft.com/office/drawing/2014/main" xmlns="" val="20001"/>
                     </a:ext>
                   </a:extLst>
                 </a:gridCol>
                 <a:gridCol w="1139292">
                   <a:extLst>
                     <a:ext uri="{9D8B030D-6E8A-4147-A177-3AD203B41FA5}">
-                      <a16:colId xmlns="" xmlns:a16="http://schemas.microsoft.com/office/drawing/2014/main" val="20002"/>
+                      <a16:colId xmlns:a16="http://schemas.microsoft.com/office/drawing/2014/main" xmlns="" val="20002"/>
                     </a:ext>
                   </a:extLst>
                 </a:gridCol>
                 <a:gridCol w="931327">
                   <a:extLst>
                     <a:ext uri="{9D8B030D-6E8A-4147-A177-3AD203B41FA5}">
-                      <a16:colId xmlns="" xmlns:a16="http://schemas.microsoft.com/office/drawing/2014/main" val="20003"/>
+                      <a16:colId xmlns:a16="http://schemas.microsoft.com/office/drawing/2014/main" xmlns="" val="20003"/>
                     </a:ext>
                   </a:extLst>
                 </a:gridCol>
                 <a:gridCol w="849949">
                   <a:extLst>
                     <a:ext uri="{9D8B030D-6E8A-4147-A177-3AD203B41FA5}">
-                      <a16:colId xmlns="" xmlns:a16="http://schemas.microsoft.com/office/drawing/2014/main" val="20004"/>
+                      <a16:colId xmlns:a16="http://schemas.microsoft.com/office/drawing/2014/main" xmlns="" val="20004"/>
                     </a:ext>
                   </a:extLst>
                 </a:gridCol>
                 <a:gridCol w="1172319">
                   <a:extLst>
                     <a:ext uri="{9D8B030D-6E8A-4147-A177-3AD203B41FA5}">
-                      <a16:colId xmlns="" xmlns:a16="http://schemas.microsoft.com/office/drawing/2014/main" val="20005"/>
+                      <a16:colId xmlns:a16="http://schemas.microsoft.com/office/drawing/2014/main" xmlns="" val="20005"/>
                     </a:ext>
                   </a:extLst>
                 </a:gridCol>
@@ -19314,7 +19314,7 @@
                 </a:tc>
                 <a:extLst>
                   <a:ext uri="{0D108BD9-81ED-4DB2-BD59-A6C34878D82A}">
-                    <a16:rowId xmlns="" xmlns:a16="http://schemas.microsoft.com/office/drawing/2014/main" val="10000"/>
+                    <a16:rowId xmlns:a16="http://schemas.microsoft.com/office/drawing/2014/main" xmlns="" val="10000"/>
                   </a:ext>
                 </a:extLst>
               </a:tr>
@@ -19339,56 +19339,56 @@
                     <a:lstStyle/>
                     <a:p>
                       <a:r>
-                        <a:rPr lang="en-IN" dirty="0"/>
-                        <a:t>35</a:t>
-                      </a:r>
-                      <a:endParaRPr lang="en-GB" dirty="0"/>
-                    </a:p>
-                  </a:txBody>
-                  <a:tcPr/>
-                </a:tc>
-                <a:tc>
-                  <a:txBody>
-                    <a:bodyPr/>
-                    <a:lstStyle/>
-                    <a:p>
-                      <a:r>
-                        <a:rPr lang="x-none">
-                          <a:effectLst/>
-                        </a:rPr>
-                        <a:t>0.846</a:t>
-                      </a:r>
-                      <a:endParaRPr lang="en-GB" dirty="0"/>
-                    </a:p>
-                  </a:txBody>
-                  <a:tcPr/>
-                </a:tc>
-                <a:tc>
-                  <a:txBody>
-                    <a:bodyPr/>
-                    <a:lstStyle/>
-                    <a:p>
-                      <a:r>
-                        <a:rPr lang="x-none">
-                          <a:effectLst/>
-                        </a:rPr>
-                        <a:t>0.846</a:t>
-                      </a:r>
-                      <a:endParaRPr lang="en-GB" dirty="0"/>
-                    </a:p>
-                  </a:txBody>
-                  <a:tcPr/>
-                </a:tc>
-                <a:tc>
-                  <a:txBody>
-                    <a:bodyPr/>
-                    <a:lstStyle/>
-                    <a:p>
-                      <a:r>
-                        <a:rPr lang="x-none" dirty="0">
-                          <a:effectLst/>
-                        </a:rPr>
-                        <a:t>0.692</a:t>
+                        <a:rPr lang="en-IN" dirty="0" smtClean="0"/>
+                        <a:t>82</a:t>
+                      </a:r>
+                      <a:endParaRPr lang="en-GB" dirty="0"/>
+                    </a:p>
+                  </a:txBody>
+                  <a:tcPr/>
+                </a:tc>
+                <a:tc>
+                  <a:txBody>
+                    <a:bodyPr/>
+                    <a:lstStyle/>
+                    <a:p>
+                      <a:r>
+                        <a:rPr lang="en-GB" dirty="0" smtClean="0">
+                          <a:effectLst/>
+                        </a:rPr>
+                        <a:t>0.576</a:t>
+                      </a:r>
+                      <a:endParaRPr lang="en-GB" dirty="0"/>
+                    </a:p>
+                  </a:txBody>
+                  <a:tcPr/>
+                </a:tc>
+                <a:tc>
+                  <a:txBody>
+                    <a:bodyPr/>
+                    <a:lstStyle/>
+                    <a:p>
+                      <a:r>
+                        <a:rPr lang="en-GB" dirty="0" smtClean="0">
+                          <a:effectLst/>
+                        </a:rPr>
+                        <a:t>0.565</a:t>
+                      </a:r>
+                      <a:endParaRPr lang="en-GB" dirty="0"/>
+                    </a:p>
+                  </a:txBody>
+                  <a:tcPr/>
+                </a:tc>
+                <a:tc>
+                  <a:txBody>
+                    <a:bodyPr/>
+                    <a:lstStyle/>
+                    <a:p>
+                      <a:r>
+                        <a:rPr lang="en-GB" dirty="0" smtClean="0">
+                          <a:effectLst/>
+                        </a:rPr>
+                        <a:t>0.153</a:t>
                       </a:r>
                       <a:endParaRPr lang="en-GB" dirty="0"/>
                     </a:p>
@@ -19411,7 +19411,7 @@
                 </a:tc>
                 <a:extLst>
                   <a:ext uri="{0D108BD9-81ED-4DB2-BD59-A6C34878D82A}">
-                    <a16:rowId xmlns="" xmlns:a16="http://schemas.microsoft.com/office/drawing/2014/main" val="10001"/>
+                    <a16:rowId xmlns:a16="http://schemas.microsoft.com/office/drawing/2014/main" xmlns="" val="10001"/>
                   </a:ext>
                 </a:extLst>
               </a:tr>
@@ -19571,7 +19571,7 @@
                 </a:tc>
                 <a:extLst>
                   <a:ext uri="{0D108BD9-81ED-4DB2-BD59-A6C34878D82A}">
-                    <a16:rowId xmlns="" xmlns:a16="http://schemas.microsoft.com/office/drawing/2014/main" val="10002"/>
+                    <a16:rowId xmlns:a16="http://schemas.microsoft.com/office/drawing/2014/main" xmlns="" val="10002"/>
                   </a:ext>
                 </a:extLst>
               </a:tr>
@@ -19712,7 +19712,7 @@
                 </a:tc>
                 <a:extLst>
                   <a:ext uri="{0D108BD9-81ED-4DB2-BD59-A6C34878D82A}">
-                    <a16:rowId xmlns="" xmlns:a16="http://schemas.microsoft.com/office/drawing/2014/main" val="10003"/>
+                    <a16:rowId xmlns:a16="http://schemas.microsoft.com/office/drawing/2014/main" xmlns="" val="10003"/>
                   </a:ext>
                 </a:extLst>
               </a:tr>
@@ -19853,7 +19853,7 @@
                 </a:tc>
                 <a:extLst>
                   <a:ext uri="{0D108BD9-81ED-4DB2-BD59-A6C34878D82A}">
-                    <a16:rowId xmlns="" xmlns:a16="http://schemas.microsoft.com/office/drawing/2014/main" val="10004"/>
+                    <a16:rowId xmlns:a16="http://schemas.microsoft.com/office/drawing/2014/main" xmlns="" val="10004"/>
                   </a:ext>
                 </a:extLst>
               </a:tr>
@@ -19996,7 +19996,7 @@
                 </a:tc>
                 <a:extLst>
                   <a:ext uri="{0D108BD9-81ED-4DB2-BD59-A6C34878D82A}">
-                    <a16:rowId xmlns="" xmlns:a16="http://schemas.microsoft.com/office/drawing/2014/main" val="10005"/>
+                    <a16:rowId xmlns:a16="http://schemas.microsoft.com/office/drawing/2014/main" xmlns="" val="10005"/>
                   </a:ext>
                 </a:extLst>
               </a:tr>
@@ -20086,28 +20086,28 @@
                 <a:gridCol w="2628900">
                   <a:extLst>
                     <a:ext uri="{9D8B030D-6E8A-4147-A177-3AD203B41FA5}">
-                      <a16:colId xmlns="" xmlns:a16="http://schemas.microsoft.com/office/drawing/2014/main" val="20000"/>
+                      <a16:colId xmlns:a16="http://schemas.microsoft.com/office/drawing/2014/main" xmlns="" val="20000"/>
                     </a:ext>
                   </a:extLst>
                 </a:gridCol>
                 <a:gridCol w="2628900">
                   <a:extLst>
                     <a:ext uri="{9D8B030D-6E8A-4147-A177-3AD203B41FA5}">
-                      <a16:colId xmlns="" xmlns:a16="http://schemas.microsoft.com/office/drawing/2014/main" val="20001"/>
+                      <a16:colId xmlns:a16="http://schemas.microsoft.com/office/drawing/2014/main" xmlns="" val="20001"/>
                     </a:ext>
                   </a:extLst>
                 </a:gridCol>
                 <a:gridCol w="2628900">
                   <a:extLst>
                     <a:ext uri="{9D8B030D-6E8A-4147-A177-3AD203B41FA5}">
-                      <a16:colId xmlns="" xmlns:a16="http://schemas.microsoft.com/office/drawing/2014/main" val="20002"/>
+                      <a16:colId xmlns:a16="http://schemas.microsoft.com/office/drawing/2014/main" xmlns="" val="20002"/>
                     </a:ext>
                   </a:extLst>
                 </a:gridCol>
                 <a:gridCol w="2628900">
                   <a:extLst>
                     <a:ext uri="{9D8B030D-6E8A-4147-A177-3AD203B41FA5}">
-                      <a16:colId xmlns="" xmlns:a16="http://schemas.microsoft.com/office/drawing/2014/main" val="20003"/>
+                      <a16:colId xmlns:a16="http://schemas.microsoft.com/office/drawing/2014/main" xmlns="" val="20003"/>
                     </a:ext>
                   </a:extLst>
                 </a:gridCol>
@@ -20171,7 +20171,7 @@
                 </a:tc>
                 <a:extLst>
                   <a:ext uri="{0D108BD9-81ED-4DB2-BD59-A6C34878D82A}">
-                    <a16:rowId xmlns="" xmlns:a16="http://schemas.microsoft.com/office/drawing/2014/main" val="10000"/>
+                    <a16:rowId xmlns:a16="http://schemas.microsoft.com/office/drawing/2014/main" xmlns="" val="10000"/>
                   </a:ext>
                 </a:extLst>
               </a:tr>
@@ -20234,7 +20234,7 @@
                 </a:tc>
                 <a:extLst>
                   <a:ext uri="{0D108BD9-81ED-4DB2-BD59-A6C34878D82A}">
-                    <a16:rowId xmlns="" xmlns:a16="http://schemas.microsoft.com/office/drawing/2014/main" val="10001"/>
+                    <a16:rowId xmlns:a16="http://schemas.microsoft.com/office/drawing/2014/main" xmlns="" val="10001"/>
                   </a:ext>
                 </a:extLst>
               </a:tr>
@@ -20327,7 +20327,7 @@
                 </a:tc>
                 <a:extLst>
                   <a:ext uri="{0D108BD9-81ED-4DB2-BD59-A6C34878D82A}">
-                    <a16:rowId xmlns="" xmlns:a16="http://schemas.microsoft.com/office/drawing/2014/main" val="10002"/>
+                    <a16:rowId xmlns:a16="http://schemas.microsoft.com/office/drawing/2014/main" xmlns="" val="10002"/>
                   </a:ext>
                 </a:extLst>
               </a:tr>
@@ -20416,7 +20416,7 @@
                 </a:tc>
                 <a:extLst>
                   <a:ext uri="{0D108BD9-81ED-4DB2-BD59-A6C34878D82A}">
-                    <a16:rowId xmlns="" xmlns:a16="http://schemas.microsoft.com/office/drawing/2014/main" val="10003"/>
+                    <a16:rowId xmlns:a16="http://schemas.microsoft.com/office/drawing/2014/main" xmlns="" val="10003"/>
                   </a:ext>
                 </a:extLst>
               </a:tr>
@@ -20518,7 +20518,7 @@
           <p:nvPr>
             <p:extLst>
               <p:ext uri="{D42A27DB-BD31-4B8C-83A1-F6EECF244321}">
-                <p14:modId xmlns:p14="http://schemas.microsoft.com/office/powerpoint/2010/main" val="665787467"/>
+                <p14:modId xmlns:p14="http://schemas.microsoft.com/office/powerpoint/2010/main" val="3091801806"/>
               </p:ext>
             </p:extLst>
           </p:nvPr>
@@ -20537,42 +20537,42 @@
                 <a:gridCol w="1074501">
                   <a:extLst>
                     <a:ext uri="{9D8B030D-6E8A-4147-A177-3AD203B41FA5}">
-                      <a16:colId xmlns="" xmlns:a16="http://schemas.microsoft.com/office/drawing/2014/main" val="20000"/>
+                      <a16:colId xmlns:a16="http://schemas.microsoft.com/office/drawing/2014/main" xmlns="" val="20000"/>
                     </a:ext>
                   </a:extLst>
                 </a:gridCol>
                 <a:gridCol w="1361982">
                   <a:extLst>
                     <a:ext uri="{9D8B030D-6E8A-4147-A177-3AD203B41FA5}">
-                      <a16:colId xmlns="" xmlns:a16="http://schemas.microsoft.com/office/drawing/2014/main" val="20001"/>
+                      <a16:colId xmlns:a16="http://schemas.microsoft.com/office/drawing/2014/main" xmlns="" val="20001"/>
                     </a:ext>
                   </a:extLst>
                 </a:gridCol>
                 <a:gridCol w="1069675">
                   <a:extLst>
                     <a:ext uri="{9D8B030D-6E8A-4147-A177-3AD203B41FA5}">
-                      <a16:colId xmlns="" xmlns:a16="http://schemas.microsoft.com/office/drawing/2014/main" val="20002"/>
+                      <a16:colId xmlns:a16="http://schemas.microsoft.com/office/drawing/2014/main" xmlns="" val="20002"/>
                     </a:ext>
                   </a:extLst>
                 </a:gridCol>
                 <a:gridCol w="776378">
                   <a:extLst>
                     <a:ext uri="{9D8B030D-6E8A-4147-A177-3AD203B41FA5}">
-                      <a16:colId xmlns="" xmlns:a16="http://schemas.microsoft.com/office/drawing/2014/main" val="20003"/>
+                      <a16:colId xmlns:a16="http://schemas.microsoft.com/office/drawing/2014/main" xmlns="" val="20003"/>
                     </a:ext>
                   </a:extLst>
                 </a:gridCol>
                 <a:gridCol w="785004">
                   <a:extLst>
                     <a:ext uri="{9D8B030D-6E8A-4147-A177-3AD203B41FA5}">
-                      <a16:colId xmlns="" xmlns:a16="http://schemas.microsoft.com/office/drawing/2014/main" val="20004"/>
+                      <a16:colId xmlns:a16="http://schemas.microsoft.com/office/drawing/2014/main" xmlns="" val="20004"/>
                     </a:ext>
                   </a:extLst>
                 </a:gridCol>
                 <a:gridCol w="1049424">
                   <a:extLst>
                     <a:ext uri="{9D8B030D-6E8A-4147-A177-3AD203B41FA5}">
-                      <a16:colId xmlns="" xmlns:a16="http://schemas.microsoft.com/office/drawing/2014/main" val="20005"/>
+                      <a16:colId xmlns:a16="http://schemas.microsoft.com/office/drawing/2014/main" xmlns="" val="20005"/>
                     </a:ext>
                   </a:extLst>
                 </a:gridCol>
@@ -20664,7 +20664,7 @@
                 </a:tc>
                 <a:extLst>
                   <a:ext uri="{0D108BD9-81ED-4DB2-BD59-A6C34878D82A}">
-                    <a16:rowId xmlns="" xmlns:a16="http://schemas.microsoft.com/office/drawing/2014/main" val="10000"/>
+                    <a16:rowId xmlns:a16="http://schemas.microsoft.com/office/drawing/2014/main" xmlns="" val="10000"/>
                   </a:ext>
                 </a:extLst>
               </a:tr>
@@ -20703,42 +20703,42 @@
                     <a:lstStyle/>
                     <a:p>
                       <a:r>
-                        <a:rPr lang="x-none">
-                          <a:effectLst/>
-                        </a:rPr>
-                        <a:t>0.846</a:t>
-                      </a:r>
-                      <a:endParaRPr lang="en-GB" dirty="0"/>
-                    </a:p>
-                  </a:txBody>
-                  <a:tcPr/>
-                </a:tc>
-                <a:tc>
-                  <a:txBody>
-                    <a:bodyPr/>
-                    <a:lstStyle/>
-                    <a:p>
-                      <a:r>
-                        <a:rPr lang="x-none">
-                          <a:effectLst/>
-                        </a:rPr>
-                        <a:t>0.846</a:t>
-                      </a:r>
-                      <a:endParaRPr lang="en-GB" dirty="0"/>
-                    </a:p>
-                  </a:txBody>
-                  <a:tcPr/>
-                </a:tc>
-                <a:tc>
-                  <a:txBody>
-                    <a:bodyPr/>
-                    <a:lstStyle/>
-                    <a:p>
-                      <a:r>
-                        <a:rPr lang="x-none" dirty="0">
-                          <a:effectLst/>
-                        </a:rPr>
-                        <a:t>0.692</a:t>
+                        <a:rPr lang="en-GB" dirty="0" smtClean="0">
+                          <a:effectLst/>
+                        </a:rPr>
+                        <a:t>0.576</a:t>
+                      </a:r>
+                      <a:endParaRPr lang="en-GB" dirty="0"/>
+                    </a:p>
+                  </a:txBody>
+                  <a:tcPr/>
+                </a:tc>
+                <a:tc>
+                  <a:txBody>
+                    <a:bodyPr/>
+                    <a:lstStyle/>
+                    <a:p>
+                      <a:r>
+                        <a:rPr lang="en-GB" dirty="0" smtClean="0">
+                          <a:effectLst/>
+                        </a:rPr>
+                        <a:t>0.565</a:t>
+                      </a:r>
+                      <a:endParaRPr lang="en-GB" dirty="0"/>
+                    </a:p>
+                  </a:txBody>
+                  <a:tcPr/>
+                </a:tc>
+                <a:tc>
+                  <a:txBody>
+                    <a:bodyPr/>
+                    <a:lstStyle/>
+                    <a:p>
+                      <a:r>
+                        <a:rPr lang="en-GB" dirty="0" smtClean="0">
+                          <a:effectLst/>
+                        </a:rPr>
+                        <a:t>0.153</a:t>
                       </a:r>
                       <a:endParaRPr lang="en-GB" dirty="0"/>
                     </a:p>
@@ -20761,7 +20761,7 @@
                 </a:tc>
                 <a:extLst>
                   <a:ext uri="{0D108BD9-81ED-4DB2-BD59-A6C34878D82A}">
-                    <a16:rowId xmlns="" xmlns:a16="http://schemas.microsoft.com/office/drawing/2014/main" val="10001"/>
+                    <a16:rowId xmlns:a16="http://schemas.microsoft.com/office/drawing/2014/main" xmlns="" val="10001"/>
                   </a:ext>
                 </a:extLst>
               </a:tr>
@@ -20919,7 +20919,7 @@
                 </a:tc>
                 <a:extLst>
                   <a:ext uri="{0D108BD9-81ED-4DB2-BD59-A6C34878D82A}">
-                    <a16:rowId xmlns="" xmlns:a16="http://schemas.microsoft.com/office/drawing/2014/main" val="10002"/>
+                    <a16:rowId xmlns:a16="http://schemas.microsoft.com/office/drawing/2014/main" xmlns="" val="10002"/>
                   </a:ext>
                 </a:extLst>
               </a:tr>
@@ -21060,7 +21060,7 @@
                 </a:tc>
                 <a:extLst>
                   <a:ext uri="{0D108BD9-81ED-4DB2-BD59-A6C34878D82A}">
-                    <a16:rowId xmlns="" xmlns:a16="http://schemas.microsoft.com/office/drawing/2014/main" val="10003"/>
+                    <a16:rowId xmlns:a16="http://schemas.microsoft.com/office/drawing/2014/main" xmlns="" val="10003"/>
                   </a:ext>
                 </a:extLst>
               </a:tr>
@@ -21201,7 +21201,7 @@
                 </a:tc>
                 <a:extLst>
                   <a:ext uri="{0D108BD9-81ED-4DB2-BD59-A6C34878D82A}">
-                    <a16:rowId xmlns="" xmlns:a16="http://schemas.microsoft.com/office/drawing/2014/main" val="10004"/>
+                    <a16:rowId xmlns:a16="http://schemas.microsoft.com/office/drawing/2014/main" xmlns="" val="10004"/>
                   </a:ext>
                 </a:extLst>
               </a:tr>
@@ -21340,7 +21340,7 @@
                 </a:tc>
                 <a:extLst>
                   <a:ext uri="{0D108BD9-81ED-4DB2-BD59-A6C34878D82A}">
-                    <a16:rowId xmlns="" xmlns:a16="http://schemas.microsoft.com/office/drawing/2014/main" val="10005"/>
+                    <a16:rowId xmlns:a16="http://schemas.microsoft.com/office/drawing/2014/main" xmlns="" val="10005"/>
                   </a:ext>
                 </a:extLst>
               </a:tr>
@@ -21412,7 +21412,7 @@
           <p:nvPr>
             <p:extLst>
               <p:ext uri="{D42A27DB-BD31-4B8C-83A1-F6EECF244321}">
-                <p14:modId xmlns:p14="http://schemas.microsoft.com/office/powerpoint/2010/main" val="594764952"/>
+                <p14:modId xmlns:p14="http://schemas.microsoft.com/office/powerpoint/2010/main" val="3635421367"/>
               </p:ext>
             </p:extLst>
           </p:nvPr>
@@ -21431,42 +21431,42 @@
                 <a:gridCol w="1074501">
                   <a:extLst>
                     <a:ext uri="{9D8B030D-6E8A-4147-A177-3AD203B41FA5}">
-                      <a16:colId xmlns="" xmlns:a16="http://schemas.microsoft.com/office/drawing/2014/main" val="20000"/>
+                      <a16:colId xmlns:a16="http://schemas.microsoft.com/office/drawing/2014/main" xmlns="" val="20000"/>
                     </a:ext>
                   </a:extLst>
                 </a:gridCol>
                 <a:gridCol w="1094563">
                   <a:extLst>
                     <a:ext uri="{9D8B030D-6E8A-4147-A177-3AD203B41FA5}">
-                      <a16:colId xmlns="" xmlns:a16="http://schemas.microsoft.com/office/drawing/2014/main" val="20001"/>
+                      <a16:colId xmlns:a16="http://schemas.microsoft.com/office/drawing/2014/main" xmlns="" val="20001"/>
                     </a:ext>
                   </a:extLst>
                 </a:gridCol>
                 <a:gridCol w="1112808">
                   <a:extLst>
                     <a:ext uri="{9D8B030D-6E8A-4147-A177-3AD203B41FA5}">
-                      <a16:colId xmlns="" xmlns:a16="http://schemas.microsoft.com/office/drawing/2014/main" val="20002"/>
+                      <a16:colId xmlns:a16="http://schemas.microsoft.com/office/drawing/2014/main" xmlns="" val="20002"/>
                     </a:ext>
                   </a:extLst>
                 </a:gridCol>
                 <a:gridCol w="755968">
                   <a:extLst>
                     <a:ext uri="{9D8B030D-6E8A-4147-A177-3AD203B41FA5}">
-                      <a16:colId xmlns="" xmlns:a16="http://schemas.microsoft.com/office/drawing/2014/main" val="20003"/>
+                      <a16:colId xmlns:a16="http://schemas.microsoft.com/office/drawing/2014/main" xmlns="" val="20003"/>
                     </a:ext>
                   </a:extLst>
                 </a:gridCol>
                 <a:gridCol w="909275">
                   <a:extLst>
                     <a:ext uri="{9D8B030D-6E8A-4147-A177-3AD203B41FA5}">
-                      <a16:colId xmlns="" xmlns:a16="http://schemas.microsoft.com/office/drawing/2014/main" val="20004"/>
+                      <a16:colId xmlns:a16="http://schemas.microsoft.com/office/drawing/2014/main" xmlns="" val="20004"/>
                     </a:ext>
                   </a:extLst>
                 </a:gridCol>
                 <a:gridCol w="1226019">
                   <a:extLst>
                     <a:ext uri="{9D8B030D-6E8A-4147-A177-3AD203B41FA5}">
-                      <a16:colId xmlns="" xmlns:a16="http://schemas.microsoft.com/office/drawing/2014/main" val="20005"/>
+                      <a16:colId xmlns:a16="http://schemas.microsoft.com/office/drawing/2014/main" xmlns="" val="20005"/>
                     </a:ext>
                   </a:extLst>
                 </a:gridCol>
@@ -21558,7 +21558,7 @@
                 </a:tc>
                 <a:extLst>
                   <a:ext uri="{0D108BD9-81ED-4DB2-BD59-A6C34878D82A}">
-                    <a16:rowId xmlns="" xmlns:a16="http://schemas.microsoft.com/office/drawing/2014/main" val="10000"/>
+                    <a16:rowId xmlns:a16="http://schemas.microsoft.com/office/drawing/2014/main" xmlns="" val="10000"/>
                   </a:ext>
                 </a:extLst>
               </a:tr>
@@ -21586,7 +21586,7 @@
                         <a:rPr lang="en-IN" dirty="0" smtClean="0">
                           <a:effectLst/>
                         </a:rPr>
-                        <a:t>1</a:t>
+                        <a:t>2</a:t>
                       </a:r>
                       <a:endParaRPr lang="en-GB" dirty="0"/>
                     </a:p>
@@ -21602,7 +21602,7 @@
                         <a:rPr lang="en-GB" dirty="0" smtClean="0">
                           <a:effectLst/>
                         </a:rPr>
-                        <a:t>0.615</a:t>
+                        <a:t>0.538</a:t>
                       </a:r>
                       <a:endParaRPr lang="en-GB" dirty="0"/>
                     </a:p>
@@ -21618,7 +21618,7 @@
                         <a:rPr lang="en-GB" dirty="0" smtClean="0">
                           <a:effectLst/>
                         </a:rPr>
-                        <a:t>0.615</a:t>
+                        <a:t>0.553</a:t>
                       </a:r>
                       <a:endParaRPr lang="en-GB" dirty="0"/>
                     </a:p>
@@ -21634,7 +21634,7 @@
                         <a:rPr lang="en-GB" dirty="0" smtClean="0">
                           <a:effectLst/>
                         </a:rPr>
-                        <a:t>0.230</a:t>
+                        <a:t>0.076</a:t>
                       </a:r>
                       <a:endParaRPr lang="en-GB" dirty="0"/>
                     </a:p>
@@ -21657,7 +21657,7 @@
                 </a:tc>
                 <a:extLst>
                   <a:ext uri="{0D108BD9-81ED-4DB2-BD59-A6C34878D82A}">
-                    <a16:rowId xmlns="" xmlns:a16="http://schemas.microsoft.com/office/drawing/2014/main" val="10001"/>
+                    <a16:rowId xmlns:a16="http://schemas.microsoft.com/office/drawing/2014/main" xmlns="" val="10001"/>
                   </a:ext>
                 </a:extLst>
               </a:tr>
@@ -21775,7 +21775,7 @@
                 </a:tc>
                 <a:extLst>
                   <a:ext uri="{0D108BD9-81ED-4DB2-BD59-A6C34878D82A}">
-                    <a16:rowId xmlns="" xmlns:a16="http://schemas.microsoft.com/office/drawing/2014/main" val="10002"/>
+                    <a16:rowId xmlns:a16="http://schemas.microsoft.com/office/drawing/2014/main" xmlns="" val="10002"/>
                   </a:ext>
                 </a:extLst>
               </a:tr>
@@ -21916,7 +21916,7 @@
                 </a:tc>
                 <a:extLst>
                   <a:ext uri="{0D108BD9-81ED-4DB2-BD59-A6C34878D82A}">
-                    <a16:rowId xmlns="" xmlns:a16="http://schemas.microsoft.com/office/drawing/2014/main" val="10003"/>
+                    <a16:rowId xmlns:a16="http://schemas.microsoft.com/office/drawing/2014/main" xmlns="" val="10003"/>
                   </a:ext>
                 </a:extLst>
               </a:tr>
@@ -22059,7 +22059,7 @@
                 </a:tc>
                 <a:extLst>
                   <a:ext uri="{0D108BD9-81ED-4DB2-BD59-A6C34878D82A}">
-                    <a16:rowId xmlns="" xmlns:a16="http://schemas.microsoft.com/office/drawing/2014/main" val="10004"/>
+                    <a16:rowId xmlns:a16="http://schemas.microsoft.com/office/drawing/2014/main" xmlns="" val="10004"/>
                   </a:ext>
                 </a:extLst>
               </a:tr>
@@ -22172,7 +22172,7 @@
                 </a:tc>
                 <a:extLst>
                   <a:ext uri="{0D108BD9-81ED-4DB2-BD59-A6C34878D82A}">
-                    <a16:rowId xmlns="" xmlns:a16="http://schemas.microsoft.com/office/drawing/2014/main" val="10005"/>
+                    <a16:rowId xmlns:a16="http://schemas.microsoft.com/office/drawing/2014/main" xmlns="" val="10005"/>
                   </a:ext>
                 </a:extLst>
               </a:tr>
@@ -22263,42 +22263,42 @@
                 <a:gridCol w="1108522">
                   <a:extLst>
                     <a:ext uri="{9D8B030D-6E8A-4147-A177-3AD203B41FA5}">
-                      <a16:colId xmlns="" xmlns:a16="http://schemas.microsoft.com/office/drawing/2014/main" val="20000"/>
+                      <a16:colId xmlns:a16="http://schemas.microsoft.com/office/drawing/2014/main" xmlns="" val="20000"/>
                     </a:ext>
                   </a:extLst>
                 </a:gridCol>
                 <a:gridCol w="1129219">
                   <a:extLst>
                     <a:ext uri="{9D8B030D-6E8A-4147-A177-3AD203B41FA5}">
-                      <a16:colId xmlns="" xmlns:a16="http://schemas.microsoft.com/office/drawing/2014/main" val="20001"/>
+                      <a16:colId xmlns:a16="http://schemas.microsoft.com/office/drawing/2014/main" xmlns="" val="20001"/>
                     </a:ext>
                   </a:extLst>
                 </a:gridCol>
                 <a:gridCol w="1148042">
                   <a:extLst>
                     <a:ext uri="{9D8B030D-6E8A-4147-A177-3AD203B41FA5}">
-                      <a16:colId xmlns="" xmlns:a16="http://schemas.microsoft.com/office/drawing/2014/main" val="20002"/>
+                      <a16:colId xmlns:a16="http://schemas.microsoft.com/office/drawing/2014/main" xmlns="" val="20002"/>
                     </a:ext>
                   </a:extLst>
                 </a:gridCol>
                 <a:gridCol w="802761">
                   <a:extLst>
                     <a:ext uri="{9D8B030D-6E8A-4147-A177-3AD203B41FA5}">
-                      <a16:colId xmlns="" xmlns:a16="http://schemas.microsoft.com/office/drawing/2014/main" val="20003"/>
+                      <a16:colId xmlns:a16="http://schemas.microsoft.com/office/drawing/2014/main" xmlns="" val="20003"/>
                     </a:ext>
                   </a:extLst>
                 </a:gridCol>
                 <a:gridCol w="857259">
                   <a:extLst>
                     <a:ext uri="{9D8B030D-6E8A-4147-A177-3AD203B41FA5}">
-                      <a16:colId xmlns="" xmlns:a16="http://schemas.microsoft.com/office/drawing/2014/main" val="20004"/>
+                      <a16:colId xmlns:a16="http://schemas.microsoft.com/office/drawing/2014/main" xmlns="" val="20004"/>
                     </a:ext>
                   </a:extLst>
                 </a:gridCol>
                 <a:gridCol w="1264838">
                   <a:extLst>
                     <a:ext uri="{9D8B030D-6E8A-4147-A177-3AD203B41FA5}">
-                      <a16:colId xmlns="" xmlns:a16="http://schemas.microsoft.com/office/drawing/2014/main" val="20005"/>
+                      <a16:colId xmlns:a16="http://schemas.microsoft.com/office/drawing/2014/main" xmlns="" val="20005"/>
                     </a:ext>
                   </a:extLst>
                 </a:gridCol>
@@ -22390,7 +22390,7 @@
                 </a:tc>
                 <a:extLst>
                   <a:ext uri="{0D108BD9-81ED-4DB2-BD59-A6C34878D82A}">
-                    <a16:rowId xmlns="" xmlns:a16="http://schemas.microsoft.com/office/drawing/2014/main" val="10000"/>
+                    <a16:rowId xmlns:a16="http://schemas.microsoft.com/office/drawing/2014/main" xmlns="" val="10000"/>
                   </a:ext>
                 </a:extLst>
               </a:tr>
@@ -22531,7 +22531,7 @@
                 </a:tc>
                 <a:extLst>
                   <a:ext uri="{0D108BD9-81ED-4DB2-BD59-A6C34878D82A}">
-                    <a16:rowId xmlns="" xmlns:a16="http://schemas.microsoft.com/office/drawing/2014/main" val="10001"/>
+                    <a16:rowId xmlns:a16="http://schemas.microsoft.com/office/drawing/2014/main" xmlns="" val="10001"/>
                   </a:ext>
                 </a:extLst>
               </a:tr>
@@ -22691,7 +22691,7 @@
                 </a:tc>
                 <a:extLst>
                   <a:ext uri="{0D108BD9-81ED-4DB2-BD59-A6C34878D82A}">
-                    <a16:rowId xmlns="" xmlns:a16="http://schemas.microsoft.com/office/drawing/2014/main" val="10002"/>
+                    <a16:rowId xmlns:a16="http://schemas.microsoft.com/office/drawing/2014/main" xmlns="" val="10002"/>
                   </a:ext>
                 </a:extLst>
               </a:tr>
@@ -22838,7 +22838,7 @@
                 </a:tc>
                 <a:extLst>
                   <a:ext uri="{0D108BD9-81ED-4DB2-BD59-A6C34878D82A}">
-                    <a16:rowId xmlns="" xmlns:a16="http://schemas.microsoft.com/office/drawing/2014/main" val="10003"/>
+                    <a16:rowId xmlns:a16="http://schemas.microsoft.com/office/drawing/2014/main" xmlns="" val="10003"/>
                   </a:ext>
                 </a:extLst>
               </a:tr>
@@ -22981,7 +22981,7 @@
                 </a:tc>
                 <a:extLst>
                   <a:ext uri="{0D108BD9-81ED-4DB2-BD59-A6C34878D82A}">
-                    <a16:rowId xmlns="" xmlns:a16="http://schemas.microsoft.com/office/drawing/2014/main" val="10004"/>
+                    <a16:rowId xmlns:a16="http://schemas.microsoft.com/office/drawing/2014/main" xmlns="" val="10004"/>
                   </a:ext>
                 </a:extLst>
               </a:tr>
@@ -23120,7 +23120,7 @@
                 </a:tc>
                 <a:extLst>
                   <a:ext uri="{0D108BD9-81ED-4DB2-BD59-A6C34878D82A}">
-                    <a16:rowId xmlns="" xmlns:a16="http://schemas.microsoft.com/office/drawing/2014/main" val="10005"/>
+                    <a16:rowId xmlns:a16="http://schemas.microsoft.com/office/drawing/2014/main" xmlns="" val="10005"/>
                   </a:ext>
                 </a:extLst>
               </a:tr>
@@ -23211,42 +23211,42 @@
                 <a:gridCol w="1074501">
                   <a:extLst>
                     <a:ext uri="{9D8B030D-6E8A-4147-A177-3AD203B41FA5}">
-                      <a16:colId xmlns="" xmlns:a16="http://schemas.microsoft.com/office/drawing/2014/main" val="20000"/>
+                      <a16:colId xmlns:a16="http://schemas.microsoft.com/office/drawing/2014/main" xmlns="" val="20000"/>
                     </a:ext>
                   </a:extLst>
                 </a:gridCol>
                 <a:gridCol w="1094563">
                   <a:extLst>
                     <a:ext uri="{9D8B030D-6E8A-4147-A177-3AD203B41FA5}">
-                      <a16:colId xmlns="" xmlns:a16="http://schemas.microsoft.com/office/drawing/2014/main" val="20001"/>
+                      <a16:colId xmlns:a16="http://schemas.microsoft.com/office/drawing/2014/main" xmlns="" val="20001"/>
                     </a:ext>
                   </a:extLst>
                 </a:gridCol>
                 <a:gridCol w="1112808">
                   <a:extLst>
                     <a:ext uri="{9D8B030D-6E8A-4147-A177-3AD203B41FA5}">
-                      <a16:colId xmlns="" xmlns:a16="http://schemas.microsoft.com/office/drawing/2014/main" val="20002"/>
+                      <a16:colId xmlns:a16="http://schemas.microsoft.com/office/drawing/2014/main" xmlns="" val="20002"/>
                     </a:ext>
                   </a:extLst>
                 </a:gridCol>
                 <a:gridCol w="785901">
                   <a:extLst>
                     <a:ext uri="{9D8B030D-6E8A-4147-A177-3AD203B41FA5}">
-                      <a16:colId xmlns="" xmlns:a16="http://schemas.microsoft.com/office/drawing/2014/main" val="20003"/>
+                      <a16:colId xmlns:a16="http://schemas.microsoft.com/office/drawing/2014/main" xmlns="" val="20003"/>
                     </a:ext>
                   </a:extLst>
                 </a:gridCol>
                 <a:gridCol w="823172">
                   <a:extLst>
                     <a:ext uri="{9D8B030D-6E8A-4147-A177-3AD203B41FA5}">
-                      <a16:colId xmlns="" xmlns:a16="http://schemas.microsoft.com/office/drawing/2014/main" val="20004"/>
+                      <a16:colId xmlns:a16="http://schemas.microsoft.com/office/drawing/2014/main" xmlns="" val="20004"/>
                     </a:ext>
                   </a:extLst>
                 </a:gridCol>
                 <a:gridCol w="1226019">
                   <a:extLst>
                     <a:ext uri="{9D8B030D-6E8A-4147-A177-3AD203B41FA5}">
-                      <a16:colId xmlns="" xmlns:a16="http://schemas.microsoft.com/office/drawing/2014/main" val="20005"/>
+                      <a16:colId xmlns:a16="http://schemas.microsoft.com/office/drawing/2014/main" xmlns="" val="20005"/>
                     </a:ext>
                   </a:extLst>
                 </a:gridCol>
@@ -23338,7 +23338,7 @@
                 </a:tc>
                 <a:extLst>
                   <a:ext uri="{0D108BD9-81ED-4DB2-BD59-A6C34878D82A}">
-                    <a16:rowId xmlns="" xmlns:a16="http://schemas.microsoft.com/office/drawing/2014/main" val="10000"/>
+                    <a16:rowId xmlns:a16="http://schemas.microsoft.com/office/drawing/2014/main" xmlns="" val="10000"/>
                   </a:ext>
                 </a:extLst>
               </a:tr>
@@ -23481,7 +23481,7 @@
                 </a:tc>
                 <a:extLst>
                   <a:ext uri="{0D108BD9-81ED-4DB2-BD59-A6C34878D82A}">
-                    <a16:rowId xmlns="" xmlns:a16="http://schemas.microsoft.com/office/drawing/2014/main" val="10001"/>
+                    <a16:rowId xmlns:a16="http://schemas.microsoft.com/office/drawing/2014/main" xmlns="" val="10001"/>
                   </a:ext>
                 </a:extLst>
               </a:tr>
@@ -23641,7 +23641,7 @@
                 </a:tc>
                 <a:extLst>
                   <a:ext uri="{0D108BD9-81ED-4DB2-BD59-A6C34878D82A}">
-                    <a16:rowId xmlns="" xmlns:a16="http://schemas.microsoft.com/office/drawing/2014/main" val="10002"/>
+                    <a16:rowId xmlns:a16="http://schemas.microsoft.com/office/drawing/2014/main" xmlns="" val="10002"/>
                   </a:ext>
                 </a:extLst>
               </a:tr>
@@ -23784,7 +23784,7 @@
                 </a:tc>
                 <a:extLst>
                   <a:ext uri="{0D108BD9-81ED-4DB2-BD59-A6C34878D82A}">
-                    <a16:rowId xmlns="" xmlns:a16="http://schemas.microsoft.com/office/drawing/2014/main" val="10003"/>
+                    <a16:rowId xmlns:a16="http://schemas.microsoft.com/office/drawing/2014/main" xmlns="" val="10003"/>
                   </a:ext>
                 </a:extLst>
               </a:tr>
@@ -23927,7 +23927,7 @@
                 </a:tc>
                 <a:extLst>
                   <a:ext uri="{0D108BD9-81ED-4DB2-BD59-A6C34878D82A}">
-                    <a16:rowId xmlns="" xmlns:a16="http://schemas.microsoft.com/office/drawing/2014/main" val="10004"/>
+                    <a16:rowId xmlns:a16="http://schemas.microsoft.com/office/drawing/2014/main" xmlns="" val="10004"/>
                   </a:ext>
                 </a:extLst>
               </a:tr>
@@ -24068,7 +24068,7 @@
                 </a:tc>
                 <a:extLst>
                   <a:ext uri="{0D108BD9-81ED-4DB2-BD59-A6C34878D82A}">
-                    <a16:rowId xmlns="" xmlns:a16="http://schemas.microsoft.com/office/drawing/2014/main" val="10005"/>
+                    <a16:rowId xmlns:a16="http://schemas.microsoft.com/office/drawing/2014/main" xmlns="" val="10005"/>
                   </a:ext>
                 </a:extLst>
               </a:tr>
@@ -24159,42 +24159,42 @@
                 <a:gridCol w="1074501">
                   <a:extLst>
                     <a:ext uri="{9D8B030D-6E8A-4147-A177-3AD203B41FA5}">
-                      <a16:colId xmlns="" xmlns:a16="http://schemas.microsoft.com/office/drawing/2014/main" val="20000"/>
+                      <a16:colId xmlns:a16="http://schemas.microsoft.com/office/drawing/2014/main" xmlns="" val="20000"/>
                     </a:ext>
                   </a:extLst>
                 </a:gridCol>
                 <a:gridCol w="1042804">
                   <a:extLst>
                     <a:ext uri="{9D8B030D-6E8A-4147-A177-3AD203B41FA5}">
-                      <a16:colId xmlns="" xmlns:a16="http://schemas.microsoft.com/office/drawing/2014/main" val="20001"/>
+                      <a16:colId xmlns:a16="http://schemas.microsoft.com/office/drawing/2014/main" xmlns="" val="20001"/>
                     </a:ext>
                   </a:extLst>
                 </a:gridCol>
                 <a:gridCol w="1086929">
                   <a:extLst>
                     <a:ext uri="{9D8B030D-6E8A-4147-A177-3AD203B41FA5}">
-                      <a16:colId xmlns="" xmlns:a16="http://schemas.microsoft.com/office/drawing/2014/main" val="20002"/>
+                      <a16:colId xmlns:a16="http://schemas.microsoft.com/office/drawing/2014/main" xmlns="" val="20002"/>
                     </a:ext>
                   </a:extLst>
                 </a:gridCol>
                 <a:gridCol w="777436">
                   <a:extLst>
                     <a:ext uri="{9D8B030D-6E8A-4147-A177-3AD203B41FA5}">
-                      <a16:colId xmlns="" xmlns:a16="http://schemas.microsoft.com/office/drawing/2014/main" val="20003"/>
+                      <a16:colId xmlns:a16="http://schemas.microsoft.com/office/drawing/2014/main" xmlns="" val="20003"/>
                     </a:ext>
                   </a:extLst>
                 </a:gridCol>
                 <a:gridCol w="909275">
                   <a:extLst>
                     <a:ext uri="{9D8B030D-6E8A-4147-A177-3AD203B41FA5}">
-                      <a16:colId xmlns="" xmlns:a16="http://schemas.microsoft.com/office/drawing/2014/main" val="20004"/>
+                      <a16:colId xmlns:a16="http://schemas.microsoft.com/office/drawing/2014/main" xmlns="" val="20004"/>
                     </a:ext>
                   </a:extLst>
                 </a:gridCol>
                 <a:gridCol w="1226019">
                   <a:extLst>
                     <a:ext uri="{9D8B030D-6E8A-4147-A177-3AD203B41FA5}">
-                      <a16:colId xmlns="" xmlns:a16="http://schemas.microsoft.com/office/drawing/2014/main" val="20005"/>
+                      <a16:colId xmlns:a16="http://schemas.microsoft.com/office/drawing/2014/main" xmlns="" val="20005"/>
                     </a:ext>
                   </a:extLst>
                 </a:gridCol>
@@ -24286,7 +24286,7 @@
                 </a:tc>
                 <a:extLst>
                   <a:ext uri="{0D108BD9-81ED-4DB2-BD59-A6C34878D82A}">
-                    <a16:rowId xmlns="" xmlns:a16="http://schemas.microsoft.com/office/drawing/2014/main" val="10000"/>
+                    <a16:rowId xmlns:a16="http://schemas.microsoft.com/office/drawing/2014/main" xmlns="" val="10000"/>
                   </a:ext>
                 </a:extLst>
               </a:tr>
@@ -24387,7 +24387,7 @@
                 </a:tc>
                 <a:extLst>
                   <a:ext uri="{0D108BD9-81ED-4DB2-BD59-A6C34878D82A}">
-                    <a16:rowId xmlns="" xmlns:a16="http://schemas.microsoft.com/office/drawing/2014/main" val="10001"/>
+                    <a16:rowId xmlns:a16="http://schemas.microsoft.com/office/drawing/2014/main" xmlns="" val="10001"/>
                   </a:ext>
                 </a:extLst>
               </a:tr>
@@ -24547,7 +24547,7 @@
                 </a:tc>
                 <a:extLst>
                   <a:ext uri="{0D108BD9-81ED-4DB2-BD59-A6C34878D82A}">
-                    <a16:rowId xmlns="" xmlns:a16="http://schemas.microsoft.com/office/drawing/2014/main" val="10002"/>
+                    <a16:rowId xmlns:a16="http://schemas.microsoft.com/office/drawing/2014/main" xmlns="" val="10002"/>
                   </a:ext>
                 </a:extLst>
               </a:tr>
@@ -24690,7 +24690,7 @@
                 </a:tc>
                 <a:extLst>
                   <a:ext uri="{0D108BD9-81ED-4DB2-BD59-A6C34878D82A}">
-                    <a16:rowId xmlns="" xmlns:a16="http://schemas.microsoft.com/office/drawing/2014/main" val="10003"/>
+                    <a16:rowId xmlns:a16="http://schemas.microsoft.com/office/drawing/2014/main" xmlns="" val="10003"/>
                   </a:ext>
                 </a:extLst>
               </a:tr>
@@ -24833,7 +24833,7 @@
                 </a:tc>
                 <a:extLst>
                   <a:ext uri="{0D108BD9-81ED-4DB2-BD59-A6C34878D82A}">
-                    <a16:rowId xmlns="" xmlns:a16="http://schemas.microsoft.com/office/drawing/2014/main" val="10004"/>
+                    <a16:rowId xmlns:a16="http://schemas.microsoft.com/office/drawing/2014/main" xmlns="" val="10004"/>
                   </a:ext>
                 </a:extLst>
               </a:tr>
@@ -24976,7 +24976,7 @@
                 </a:tc>
                 <a:extLst>
                   <a:ext uri="{0D108BD9-81ED-4DB2-BD59-A6C34878D82A}">
-                    <a16:rowId xmlns="" xmlns:a16="http://schemas.microsoft.com/office/drawing/2014/main" val="10005"/>
+                    <a16:rowId xmlns:a16="http://schemas.microsoft.com/office/drawing/2014/main" xmlns="" val="10005"/>
                   </a:ext>
                 </a:extLst>
               </a:tr>
@@ -25067,42 +25067,42 @@
                 <a:gridCol w="1074501">
                   <a:extLst>
                     <a:ext uri="{9D8B030D-6E8A-4147-A177-3AD203B41FA5}">
-                      <a16:colId xmlns="" xmlns:a16="http://schemas.microsoft.com/office/drawing/2014/main" val="20000"/>
+                      <a16:colId xmlns:a16="http://schemas.microsoft.com/office/drawing/2014/main" xmlns="" val="20000"/>
                     </a:ext>
                   </a:extLst>
                 </a:gridCol>
                 <a:gridCol w="1051431">
                   <a:extLst>
                     <a:ext uri="{9D8B030D-6E8A-4147-A177-3AD203B41FA5}">
-                      <a16:colId xmlns="" xmlns:a16="http://schemas.microsoft.com/office/drawing/2014/main" val="20001"/>
+                      <a16:colId xmlns:a16="http://schemas.microsoft.com/office/drawing/2014/main" xmlns="" val="20001"/>
                     </a:ext>
                   </a:extLst>
                 </a:gridCol>
                 <a:gridCol w="1104181">
                   <a:extLst>
                     <a:ext uri="{9D8B030D-6E8A-4147-A177-3AD203B41FA5}">
-                      <a16:colId xmlns="" xmlns:a16="http://schemas.microsoft.com/office/drawing/2014/main" val="20002"/>
+                      <a16:colId xmlns:a16="http://schemas.microsoft.com/office/drawing/2014/main" xmlns="" val="20002"/>
                     </a:ext>
                   </a:extLst>
                 </a:gridCol>
                 <a:gridCol w="751557">
                   <a:extLst>
                     <a:ext uri="{9D8B030D-6E8A-4147-A177-3AD203B41FA5}">
-                      <a16:colId xmlns="" xmlns:a16="http://schemas.microsoft.com/office/drawing/2014/main" val="20003"/>
+                      <a16:colId xmlns:a16="http://schemas.microsoft.com/office/drawing/2014/main" xmlns="" val="20003"/>
                     </a:ext>
                   </a:extLst>
                 </a:gridCol>
                 <a:gridCol w="909275">
                   <a:extLst>
                     <a:ext uri="{9D8B030D-6E8A-4147-A177-3AD203B41FA5}">
-                      <a16:colId xmlns="" xmlns:a16="http://schemas.microsoft.com/office/drawing/2014/main" val="20004"/>
+                      <a16:colId xmlns:a16="http://schemas.microsoft.com/office/drawing/2014/main" xmlns="" val="20004"/>
                     </a:ext>
                   </a:extLst>
                 </a:gridCol>
                 <a:gridCol w="1226019">
                   <a:extLst>
                     <a:ext uri="{9D8B030D-6E8A-4147-A177-3AD203B41FA5}">
-                      <a16:colId xmlns="" xmlns:a16="http://schemas.microsoft.com/office/drawing/2014/main" val="20005"/>
+                      <a16:colId xmlns:a16="http://schemas.microsoft.com/office/drawing/2014/main" xmlns="" val="20005"/>
                     </a:ext>
                   </a:extLst>
                 </a:gridCol>
@@ -25194,7 +25194,7 @@
                 </a:tc>
                 <a:extLst>
                   <a:ext uri="{0D108BD9-81ED-4DB2-BD59-A6C34878D82A}">
-                    <a16:rowId xmlns="" xmlns:a16="http://schemas.microsoft.com/office/drawing/2014/main" val="10000"/>
+                    <a16:rowId xmlns:a16="http://schemas.microsoft.com/office/drawing/2014/main" xmlns="" val="10000"/>
                   </a:ext>
                 </a:extLst>
               </a:tr>
@@ -25333,7 +25333,7 @@
                 </a:tc>
                 <a:extLst>
                   <a:ext uri="{0D108BD9-81ED-4DB2-BD59-A6C34878D82A}">
-                    <a16:rowId xmlns="" xmlns:a16="http://schemas.microsoft.com/office/drawing/2014/main" val="10001"/>
+                    <a16:rowId xmlns:a16="http://schemas.microsoft.com/office/drawing/2014/main" xmlns="" val="10001"/>
                   </a:ext>
                 </a:extLst>
               </a:tr>
@@ -25489,7 +25489,7 @@
                 </a:tc>
                 <a:extLst>
                   <a:ext uri="{0D108BD9-81ED-4DB2-BD59-A6C34878D82A}">
-                    <a16:rowId xmlns="" xmlns:a16="http://schemas.microsoft.com/office/drawing/2014/main" val="10002"/>
+                    <a16:rowId xmlns:a16="http://schemas.microsoft.com/office/drawing/2014/main" xmlns="" val="10002"/>
                   </a:ext>
                 </a:extLst>
               </a:tr>
@@ -25628,7 +25628,7 @@
                 </a:tc>
                 <a:extLst>
                   <a:ext uri="{0D108BD9-81ED-4DB2-BD59-A6C34878D82A}">
-                    <a16:rowId xmlns="" xmlns:a16="http://schemas.microsoft.com/office/drawing/2014/main" val="10003"/>
+                    <a16:rowId xmlns:a16="http://schemas.microsoft.com/office/drawing/2014/main" xmlns="" val="10003"/>
                   </a:ext>
                 </a:extLst>
               </a:tr>
@@ -25767,7 +25767,7 @@
                 </a:tc>
                 <a:extLst>
                   <a:ext uri="{0D108BD9-81ED-4DB2-BD59-A6C34878D82A}">
-                    <a16:rowId xmlns="" xmlns:a16="http://schemas.microsoft.com/office/drawing/2014/main" val="10004"/>
+                    <a16:rowId xmlns:a16="http://schemas.microsoft.com/office/drawing/2014/main" xmlns="" val="10004"/>
                   </a:ext>
                 </a:extLst>
               </a:tr>
@@ -25906,7 +25906,7 @@
                 </a:tc>
                 <a:extLst>
                   <a:ext uri="{0D108BD9-81ED-4DB2-BD59-A6C34878D82A}">
-                    <a16:rowId xmlns="" xmlns:a16="http://schemas.microsoft.com/office/drawing/2014/main" val="10005"/>
+                    <a16:rowId xmlns:a16="http://schemas.microsoft.com/office/drawing/2014/main" xmlns="" val="10005"/>
                   </a:ext>
                 </a:extLst>
               </a:tr>
@@ -26812,7 +26812,7 @@
           <p:nvPr>
             <p:extLst>
               <p:ext uri="{D42A27DB-BD31-4B8C-83A1-F6EECF244321}">
-                <p14:modId xmlns:p14="http://schemas.microsoft.com/office/powerpoint/2010/main" val="2328162914"/>
+                <p14:modId xmlns:p14="http://schemas.microsoft.com/office/powerpoint/2010/main" val="2100039267"/>
               </p:ext>
             </p:extLst>
           </p:nvPr>
@@ -26868,7 +26868,7 @@
                         <a:rPr lang="en-IN" dirty="0" smtClean="0">
                           <a:effectLst/>
                         </a:rPr>
-                        <a:t>1</a:t>
+                        <a:t>2</a:t>
                       </a:r>
                       <a:endParaRPr lang="en-GB" dirty="0"/>
                     </a:p>
@@ -27043,8 +27043,8 @@
         </p:nvSpPr>
         <p:spPr>
           <a:xfrm>
-            <a:off x="6409426" y="4264560"/>
-            <a:ext cx="4416725" cy="646331"/>
+            <a:off x="6392173" y="4156397"/>
+            <a:ext cx="4416725" cy="923330"/>
           </a:xfrm>
           <a:prstGeom prst="rect">
             <a:avLst/>
@@ -27073,8 +27073,17 @@
             </a:r>
             <a:r>
               <a:rPr lang="en-GB" dirty="0"/>
+              <a:t>"                "</a:t>
+            </a:r>
+            <a:r>
+              <a:rPr lang="en-GB" dirty="0" err="1"/>
+              <a:t>diastolicMaxMeanAxialVelocity</a:t>
+            </a:r>
+            <a:r>
+              <a:rPr lang="en-GB" dirty="0"/>
               <a:t>"</a:t>
             </a:r>
+            <a:endParaRPr lang="en-GB" dirty="0"/>
           </a:p>
         </p:txBody>
       </p:sp>
@@ -27590,42 +27599,42 @@
                 <a:gridCol w="1074501">
                   <a:extLst>
                     <a:ext uri="{9D8B030D-6E8A-4147-A177-3AD203B41FA5}">
-                      <a16:colId xmlns="" xmlns:a16="http://schemas.microsoft.com/office/drawing/2014/main" val="20000"/>
+                      <a16:colId xmlns:a16="http://schemas.microsoft.com/office/drawing/2014/main" xmlns="" val="20000"/>
                     </a:ext>
                   </a:extLst>
                 </a:gridCol>
                 <a:gridCol w="1292971">
                   <a:extLst>
                     <a:ext uri="{9D8B030D-6E8A-4147-A177-3AD203B41FA5}">
-                      <a16:colId xmlns="" xmlns:a16="http://schemas.microsoft.com/office/drawing/2014/main" val="20001"/>
+                      <a16:colId xmlns:a16="http://schemas.microsoft.com/office/drawing/2014/main" xmlns="" val="20001"/>
                     </a:ext>
                   </a:extLst>
                 </a:gridCol>
                 <a:gridCol w="1121434">
                   <a:extLst>
                     <a:ext uri="{9D8B030D-6E8A-4147-A177-3AD203B41FA5}">
-                      <a16:colId xmlns="" xmlns:a16="http://schemas.microsoft.com/office/drawing/2014/main" val="20002"/>
+                      <a16:colId xmlns:a16="http://schemas.microsoft.com/office/drawing/2014/main" xmlns="" val="20002"/>
                     </a:ext>
                   </a:extLst>
                 </a:gridCol>
                 <a:gridCol w="802256">
                   <a:extLst>
                     <a:ext uri="{9D8B030D-6E8A-4147-A177-3AD203B41FA5}">
-                      <a16:colId xmlns="" xmlns:a16="http://schemas.microsoft.com/office/drawing/2014/main" val="20003"/>
+                      <a16:colId xmlns:a16="http://schemas.microsoft.com/office/drawing/2014/main" xmlns="" val="20003"/>
                     </a:ext>
                   </a:extLst>
                 </a:gridCol>
                 <a:gridCol w="888521">
                   <a:extLst>
                     <a:ext uri="{9D8B030D-6E8A-4147-A177-3AD203B41FA5}">
-                      <a16:colId xmlns="" xmlns:a16="http://schemas.microsoft.com/office/drawing/2014/main" val="20004"/>
+                      <a16:colId xmlns:a16="http://schemas.microsoft.com/office/drawing/2014/main" xmlns="" val="20004"/>
                     </a:ext>
                   </a:extLst>
                 </a:gridCol>
                 <a:gridCol w="1035170">
                   <a:extLst>
                     <a:ext uri="{9D8B030D-6E8A-4147-A177-3AD203B41FA5}">
-                      <a16:colId xmlns="" xmlns:a16="http://schemas.microsoft.com/office/drawing/2014/main" val="20005"/>
+                      <a16:colId xmlns:a16="http://schemas.microsoft.com/office/drawing/2014/main" xmlns="" val="20005"/>
                     </a:ext>
                   </a:extLst>
                 </a:gridCol>
@@ -27717,7 +27726,7 @@
                 </a:tc>
                 <a:extLst>
                   <a:ext uri="{0D108BD9-81ED-4DB2-BD59-A6C34878D82A}">
-                    <a16:rowId xmlns="" xmlns:a16="http://schemas.microsoft.com/office/drawing/2014/main" val="10000"/>
+                    <a16:rowId xmlns:a16="http://schemas.microsoft.com/office/drawing/2014/main" xmlns="" val="10000"/>
                   </a:ext>
                 </a:extLst>
               </a:tr>
@@ -27814,7 +27823,7 @@
                 </a:tc>
                 <a:extLst>
                   <a:ext uri="{0D108BD9-81ED-4DB2-BD59-A6C34878D82A}">
-                    <a16:rowId xmlns="" xmlns:a16="http://schemas.microsoft.com/office/drawing/2014/main" val="10001"/>
+                    <a16:rowId xmlns:a16="http://schemas.microsoft.com/office/drawing/2014/main" xmlns="" val="10001"/>
                   </a:ext>
                 </a:extLst>
               </a:tr>
@@ -27972,7 +27981,7 @@
                 </a:tc>
                 <a:extLst>
                   <a:ext uri="{0D108BD9-81ED-4DB2-BD59-A6C34878D82A}">
-                    <a16:rowId xmlns="" xmlns:a16="http://schemas.microsoft.com/office/drawing/2014/main" val="10002"/>
+                    <a16:rowId xmlns:a16="http://schemas.microsoft.com/office/drawing/2014/main" xmlns="" val="10002"/>
                   </a:ext>
                 </a:extLst>
               </a:tr>
@@ -28113,7 +28122,7 @@
                 </a:tc>
                 <a:extLst>
                   <a:ext uri="{0D108BD9-81ED-4DB2-BD59-A6C34878D82A}">
-                    <a16:rowId xmlns="" xmlns:a16="http://schemas.microsoft.com/office/drawing/2014/main" val="10003"/>
+                    <a16:rowId xmlns:a16="http://schemas.microsoft.com/office/drawing/2014/main" xmlns="" val="10003"/>
                   </a:ext>
                 </a:extLst>
               </a:tr>
@@ -28252,7 +28261,7 @@
                 </a:tc>
                 <a:extLst>
                   <a:ext uri="{0D108BD9-81ED-4DB2-BD59-A6C34878D82A}">
-                    <a16:rowId xmlns="" xmlns:a16="http://schemas.microsoft.com/office/drawing/2014/main" val="10004"/>
+                    <a16:rowId xmlns:a16="http://schemas.microsoft.com/office/drawing/2014/main" xmlns="" val="10004"/>
                   </a:ext>
                 </a:extLst>
               </a:tr>
@@ -28393,7 +28402,7 @@
                 </a:tc>
                 <a:extLst>
                   <a:ext uri="{0D108BD9-81ED-4DB2-BD59-A6C34878D82A}">
-                    <a16:rowId xmlns="" xmlns:a16="http://schemas.microsoft.com/office/drawing/2014/main" val="10005"/>
+                    <a16:rowId xmlns:a16="http://schemas.microsoft.com/office/drawing/2014/main" xmlns="" val="10005"/>
                   </a:ext>
                 </a:extLst>
               </a:tr>
@@ -28840,42 +28849,42 @@
                 <a:gridCol w="1074501">
                   <a:extLst>
                     <a:ext uri="{9D8B030D-6E8A-4147-A177-3AD203B41FA5}">
-                      <a16:colId xmlns="" xmlns:a16="http://schemas.microsoft.com/office/drawing/2014/main" val="20000"/>
+                      <a16:colId xmlns:a16="http://schemas.microsoft.com/office/drawing/2014/main" xmlns="" val="20000"/>
                     </a:ext>
                   </a:extLst>
                 </a:gridCol>
                 <a:gridCol w="1137695">
                   <a:extLst>
                     <a:ext uri="{9D8B030D-6E8A-4147-A177-3AD203B41FA5}">
-                      <a16:colId xmlns="" xmlns:a16="http://schemas.microsoft.com/office/drawing/2014/main" val="20001"/>
+                      <a16:colId xmlns:a16="http://schemas.microsoft.com/office/drawing/2014/main" xmlns="" val="20001"/>
                     </a:ext>
                   </a:extLst>
                 </a:gridCol>
                 <a:gridCol w="1086928">
                   <a:extLst>
                     <a:ext uri="{9D8B030D-6E8A-4147-A177-3AD203B41FA5}">
-                      <a16:colId xmlns="" xmlns:a16="http://schemas.microsoft.com/office/drawing/2014/main" val="20002"/>
+                      <a16:colId xmlns:a16="http://schemas.microsoft.com/office/drawing/2014/main" xmlns="" val="20002"/>
                     </a:ext>
                   </a:extLst>
                 </a:gridCol>
                 <a:gridCol w="888521">
                   <a:extLst>
                     <a:ext uri="{9D8B030D-6E8A-4147-A177-3AD203B41FA5}">
-                      <a16:colId xmlns="" xmlns:a16="http://schemas.microsoft.com/office/drawing/2014/main" val="20003"/>
+                      <a16:colId xmlns:a16="http://schemas.microsoft.com/office/drawing/2014/main" xmlns="" val="20003"/>
                     </a:ext>
                   </a:extLst>
                 </a:gridCol>
                 <a:gridCol w="810883">
                   <a:extLst>
                     <a:ext uri="{9D8B030D-6E8A-4147-A177-3AD203B41FA5}">
-                      <a16:colId xmlns="" xmlns:a16="http://schemas.microsoft.com/office/drawing/2014/main" val="20004"/>
+                      <a16:colId xmlns:a16="http://schemas.microsoft.com/office/drawing/2014/main" xmlns="" val="20004"/>
                     </a:ext>
                   </a:extLst>
                 </a:gridCol>
                 <a:gridCol w="1118436">
                   <a:extLst>
                     <a:ext uri="{9D8B030D-6E8A-4147-A177-3AD203B41FA5}">
-                      <a16:colId xmlns="" xmlns:a16="http://schemas.microsoft.com/office/drawing/2014/main" val="20005"/>
+                      <a16:colId xmlns:a16="http://schemas.microsoft.com/office/drawing/2014/main" xmlns="" val="20005"/>
                     </a:ext>
                   </a:extLst>
                 </a:gridCol>
@@ -28967,7 +28976,7 @@
                 </a:tc>
                 <a:extLst>
                   <a:ext uri="{0D108BD9-81ED-4DB2-BD59-A6C34878D82A}">
-                    <a16:rowId xmlns="" xmlns:a16="http://schemas.microsoft.com/office/drawing/2014/main" val="10000"/>
+                    <a16:rowId xmlns:a16="http://schemas.microsoft.com/office/drawing/2014/main" xmlns="" val="10000"/>
                   </a:ext>
                 </a:extLst>
               </a:tr>
@@ -29066,7 +29075,7 @@
                 </a:tc>
                 <a:extLst>
                   <a:ext uri="{0D108BD9-81ED-4DB2-BD59-A6C34878D82A}">
-                    <a16:rowId xmlns="" xmlns:a16="http://schemas.microsoft.com/office/drawing/2014/main" val="10001"/>
+                    <a16:rowId xmlns:a16="http://schemas.microsoft.com/office/drawing/2014/main" xmlns="" val="10001"/>
                   </a:ext>
                 </a:extLst>
               </a:tr>
@@ -29224,7 +29233,7 @@
                 </a:tc>
                 <a:extLst>
                   <a:ext uri="{0D108BD9-81ED-4DB2-BD59-A6C34878D82A}">
-                    <a16:rowId xmlns="" xmlns:a16="http://schemas.microsoft.com/office/drawing/2014/main" val="10002"/>
+                    <a16:rowId xmlns:a16="http://schemas.microsoft.com/office/drawing/2014/main" xmlns="" val="10002"/>
                   </a:ext>
                 </a:extLst>
               </a:tr>
@@ -29363,7 +29372,7 @@
                 </a:tc>
                 <a:extLst>
                   <a:ext uri="{0D108BD9-81ED-4DB2-BD59-A6C34878D82A}">
-                    <a16:rowId xmlns="" xmlns:a16="http://schemas.microsoft.com/office/drawing/2014/main" val="10003"/>
+                    <a16:rowId xmlns:a16="http://schemas.microsoft.com/office/drawing/2014/main" xmlns="" val="10003"/>
                   </a:ext>
                 </a:extLst>
               </a:tr>
@@ -29462,7 +29471,7 @@
                 </a:tc>
                 <a:extLst>
                   <a:ext uri="{0D108BD9-81ED-4DB2-BD59-A6C34878D82A}">
-                    <a16:rowId xmlns="" xmlns:a16="http://schemas.microsoft.com/office/drawing/2014/main" val="10004"/>
+                    <a16:rowId xmlns:a16="http://schemas.microsoft.com/office/drawing/2014/main" xmlns="" val="10004"/>
                   </a:ext>
                 </a:extLst>
               </a:tr>
@@ -29563,7 +29572,7 @@
                 </a:tc>
                 <a:extLst>
                   <a:ext uri="{0D108BD9-81ED-4DB2-BD59-A6C34878D82A}">
-                    <a16:rowId xmlns="" xmlns:a16="http://schemas.microsoft.com/office/drawing/2014/main" val="10005"/>
+                    <a16:rowId xmlns:a16="http://schemas.microsoft.com/office/drawing/2014/main" xmlns="" val="10005"/>
                   </a:ext>
                 </a:extLst>
               </a:tr>
@@ -29654,42 +29663,42 @@
                 <a:gridCol w="1074501">
                   <a:extLst>
                     <a:ext uri="{9D8B030D-6E8A-4147-A177-3AD203B41FA5}">
-                      <a16:colId xmlns="" xmlns:a16="http://schemas.microsoft.com/office/drawing/2014/main" val="20000"/>
+                      <a16:colId xmlns:a16="http://schemas.microsoft.com/office/drawing/2014/main" xmlns="" val="20000"/>
                     </a:ext>
                   </a:extLst>
                 </a:gridCol>
                 <a:gridCol w="1361982">
                   <a:extLst>
                     <a:ext uri="{9D8B030D-6E8A-4147-A177-3AD203B41FA5}">
-                      <a16:colId xmlns="" xmlns:a16="http://schemas.microsoft.com/office/drawing/2014/main" val="20001"/>
+                      <a16:colId xmlns:a16="http://schemas.microsoft.com/office/drawing/2014/main" xmlns="" val="20001"/>
                     </a:ext>
                   </a:extLst>
                 </a:gridCol>
                 <a:gridCol w="1069675">
                   <a:extLst>
                     <a:ext uri="{9D8B030D-6E8A-4147-A177-3AD203B41FA5}">
-                      <a16:colId xmlns="" xmlns:a16="http://schemas.microsoft.com/office/drawing/2014/main" val="20002"/>
+                      <a16:colId xmlns:a16="http://schemas.microsoft.com/office/drawing/2014/main" xmlns="" val="20002"/>
                     </a:ext>
                   </a:extLst>
                 </a:gridCol>
                 <a:gridCol w="776378">
                   <a:extLst>
                     <a:ext uri="{9D8B030D-6E8A-4147-A177-3AD203B41FA5}">
-                      <a16:colId xmlns="" xmlns:a16="http://schemas.microsoft.com/office/drawing/2014/main" val="20003"/>
+                      <a16:colId xmlns:a16="http://schemas.microsoft.com/office/drawing/2014/main" xmlns="" val="20003"/>
                     </a:ext>
                   </a:extLst>
                 </a:gridCol>
                 <a:gridCol w="785004">
                   <a:extLst>
                     <a:ext uri="{9D8B030D-6E8A-4147-A177-3AD203B41FA5}">
-                      <a16:colId xmlns="" xmlns:a16="http://schemas.microsoft.com/office/drawing/2014/main" val="20004"/>
+                      <a16:colId xmlns:a16="http://schemas.microsoft.com/office/drawing/2014/main" xmlns="" val="20004"/>
                     </a:ext>
                   </a:extLst>
                 </a:gridCol>
                 <a:gridCol w="1049424">
                   <a:extLst>
                     <a:ext uri="{9D8B030D-6E8A-4147-A177-3AD203B41FA5}">
-                      <a16:colId xmlns="" xmlns:a16="http://schemas.microsoft.com/office/drawing/2014/main" val="20005"/>
+                      <a16:colId xmlns:a16="http://schemas.microsoft.com/office/drawing/2014/main" xmlns="" val="20005"/>
                     </a:ext>
                   </a:extLst>
                 </a:gridCol>
@@ -29781,7 +29790,7 @@
                 </a:tc>
                 <a:extLst>
                   <a:ext uri="{0D108BD9-81ED-4DB2-BD59-A6C34878D82A}">
-                    <a16:rowId xmlns="" xmlns:a16="http://schemas.microsoft.com/office/drawing/2014/main" val="10000"/>
+                    <a16:rowId xmlns:a16="http://schemas.microsoft.com/office/drawing/2014/main" xmlns="" val="10000"/>
                   </a:ext>
                 </a:extLst>
               </a:tr>
@@ -29878,7 +29887,7 @@
                 </a:tc>
                 <a:extLst>
                   <a:ext uri="{0D108BD9-81ED-4DB2-BD59-A6C34878D82A}">
-                    <a16:rowId xmlns="" xmlns:a16="http://schemas.microsoft.com/office/drawing/2014/main" val="10001"/>
+                    <a16:rowId xmlns:a16="http://schemas.microsoft.com/office/drawing/2014/main" xmlns="" val="10001"/>
                   </a:ext>
                 </a:extLst>
               </a:tr>
@@ -30038,7 +30047,7 @@
                 </a:tc>
                 <a:extLst>
                   <a:ext uri="{0D108BD9-81ED-4DB2-BD59-A6C34878D82A}">
-                    <a16:rowId xmlns="" xmlns:a16="http://schemas.microsoft.com/office/drawing/2014/main" val="10002"/>
+                    <a16:rowId xmlns:a16="http://schemas.microsoft.com/office/drawing/2014/main" xmlns="" val="10002"/>
                   </a:ext>
                 </a:extLst>
               </a:tr>
@@ -30179,7 +30188,7 @@
                 </a:tc>
                 <a:extLst>
                   <a:ext uri="{0D108BD9-81ED-4DB2-BD59-A6C34878D82A}">
-                    <a16:rowId xmlns="" xmlns:a16="http://schemas.microsoft.com/office/drawing/2014/main" val="10003"/>
+                    <a16:rowId xmlns:a16="http://schemas.microsoft.com/office/drawing/2014/main" xmlns="" val="10003"/>
                   </a:ext>
                 </a:extLst>
               </a:tr>
@@ -30320,7 +30329,7 @@
                 </a:tc>
                 <a:extLst>
                   <a:ext uri="{0D108BD9-81ED-4DB2-BD59-A6C34878D82A}">
-                    <a16:rowId xmlns="" xmlns:a16="http://schemas.microsoft.com/office/drawing/2014/main" val="10004"/>
+                    <a16:rowId xmlns:a16="http://schemas.microsoft.com/office/drawing/2014/main" xmlns="" val="10004"/>
                   </a:ext>
                 </a:extLst>
               </a:tr>
@@ -30419,7 +30428,7 @@
                 </a:tc>
                 <a:extLst>
                   <a:ext uri="{0D108BD9-81ED-4DB2-BD59-A6C34878D82A}">
-                    <a16:rowId xmlns="" xmlns:a16="http://schemas.microsoft.com/office/drawing/2014/main" val="10005"/>
+                    <a16:rowId xmlns:a16="http://schemas.microsoft.com/office/drawing/2014/main" xmlns="" val="10005"/>
                   </a:ext>
                 </a:extLst>
               </a:tr>
@@ -30510,42 +30519,42 @@
                 <a:gridCol w="1074501">
                   <a:extLst>
                     <a:ext uri="{9D8B030D-6E8A-4147-A177-3AD203B41FA5}">
-                      <a16:colId xmlns="" xmlns:a16="http://schemas.microsoft.com/office/drawing/2014/main" val="20000"/>
+                      <a16:colId xmlns:a16="http://schemas.microsoft.com/office/drawing/2014/main" xmlns="" val="20000"/>
                     </a:ext>
                   </a:extLst>
                 </a:gridCol>
                 <a:gridCol w="1094563">
                   <a:extLst>
                     <a:ext uri="{9D8B030D-6E8A-4147-A177-3AD203B41FA5}">
-                      <a16:colId xmlns="" xmlns:a16="http://schemas.microsoft.com/office/drawing/2014/main" val="20001"/>
+                      <a16:colId xmlns:a16="http://schemas.microsoft.com/office/drawing/2014/main" xmlns="" val="20001"/>
                     </a:ext>
                   </a:extLst>
                 </a:gridCol>
                 <a:gridCol w="1112808">
                   <a:extLst>
                     <a:ext uri="{9D8B030D-6E8A-4147-A177-3AD203B41FA5}">
-                      <a16:colId xmlns="" xmlns:a16="http://schemas.microsoft.com/office/drawing/2014/main" val="20002"/>
+                      <a16:colId xmlns:a16="http://schemas.microsoft.com/office/drawing/2014/main" xmlns="" val="20002"/>
                     </a:ext>
                   </a:extLst>
                 </a:gridCol>
                 <a:gridCol w="755968">
                   <a:extLst>
                     <a:ext uri="{9D8B030D-6E8A-4147-A177-3AD203B41FA5}">
-                      <a16:colId xmlns="" xmlns:a16="http://schemas.microsoft.com/office/drawing/2014/main" val="20003"/>
+                      <a16:colId xmlns:a16="http://schemas.microsoft.com/office/drawing/2014/main" xmlns="" val="20003"/>
                     </a:ext>
                   </a:extLst>
                 </a:gridCol>
                 <a:gridCol w="909275">
                   <a:extLst>
                     <a:ext uri="{9D8B030D-6E8A-4147-A177-3AD203B41FA5}">
-                      <a16:colId xmlns="" xmlns:a16="http://schemas.microsoft.com/office/drawing/2014/main" val="20004"/>
+                      <a16:colId xmlns:a16="http://schemas.microsoft.com/office/drawing/2014/main" xmlns="" val="20004"/>
                     </a:ext>
                   </a:extLst>
                 </a:gridCol>
                 <a:gridCol w="1226019">
                   <a:extLst>
                     <a:ext uri="{9D8B030D-6E8A-4147-A177-3AD203B41FA5}">
-                      <a16:colId xmlns="" xmlns:a16="http://schemas.microsoft.com/office/drawing/2014/main" val="20005"/>
+                      <a16:colId xmlns:a16="http://schemas.microsoft.com/office/drawing/2014/main" xmlns="" val="20005"/>
                     </a:ext>
                   </a:extLst>
                 </a:gridCol>
@@ -30637,7 +30646,7 @@
                 </a:tc>
                 <a:extLst>
                   <a:ext uri="{0D108BD9-81ED-4DB2-BD59-A6C34878D82A}">
-                    <a16:rowId xmlns="" xmlns:a16="http://schemas.microsoft.com/office/drawing/2014/main" val="10000"/>
+                    <a16:rowId xmlns:a16="http://schemas.microsoft.com/office/drawing/2014/main" xmlns="" val="10000"/>
                   </a:ext>
                 </a:extLst>
               </a:tr>
@@ -30736,7 +30745,7 @@
                 </a:tc>
                 <a:extLst>
                   <a:ext uri="{0D108BD9-81ED-4DB2-BD59-A6C34878D82A}">
-                    <a16:rowId xmlns="" xmlns:a16="http://schemas.microsoft.com/office/drawing/2014/main" val="10001"/>
+                    <a16:rowId xmlns:a16="http://schemas.microsoft.com/office/drawing/2014/main" xmlns="" val="10001"/>
                   </a:ext>
                 </a:extLst>
               </a:tr>
@@ -30854,7 +30863,7 @@
                 </a:tc>
                 <a:extLst>
                   <a:ext uri="{0D108BD9-81ED-4DB2-BD59-A6C34878D82A}">
-                    <a16:rowId xmlns="" xmlns:a16="http://schemas.microsoft.com/office/drawing/2014/main" val="10002"/>
+                    <a16:rowId xmlns:a16="http://schemas.microsoft.com/office/drawing/2014/main" xmlns="" val="10002"/>
                   </a:ext>
                 </a:extLst>
               </a:tr>
@@ -30995,7 +31004,7 @@
                 </a:tc>
                 <a:extLst>
                   <a:ext uri="{0D108BD9-81ED-4DB2-BD59-A6C34878D82A}">
-                    <a16:rowId xmlns="" xmlns:a16="http://schemas.microsoft.com/office/drawing/2014/main" val="10003"/>
+                    <a16:rowId xmlns:a16="http://schemas.microsoft.com/office/drawing/2014/main" xmlns="" val="10003"/>
                   </a:ext>
                 </a:extLst>
               </a:tr>
@@ -31136,7 +31145,7 @@
                 </a:tc>
                 <a:extLst>
                   <a:ext uri="{0D108BD9-81ED-4DB2-BD59-A6C34878D82A}">
-                    <a16:rowId xmlns="" xmlns:a16="http://schemas.microsoft.com/office/drawing/2014/main" val="10004"/>
+                    <a16:rowId xmlns:a16="http://schemas.microsoft.com/office/drawing/2014/main" xmlns="" val="10004"/>
                   </a:ext>
                 </a:extLst>
               </a:tr>
@@ -31249,7 +31258,7 @@
                 </a:tc>
                 <a:extLst>
                   <a:ext uri="{0D108BD9-81ED-4DB2-BD59-A6C34878D82A}">
-                    <a16:rowId xmlns="" xmlns:a16="http://schemas.microsoft.com/office/drawing/2014/main" val="10005"/>
+                    <a16:rowId xmlns:a16="http://schemas.microsoft.com/office/drawing/2014/main" xmlns="" val="10005"/>
                   </a:ext>
                 </a:extLst>
               </a:tr>
@@ -31340,42 +31349,42 @@
                 <a:gridCol w="1108522">
                   <a:extLst>
                     <a:ext uri="{9D8B030D-6E8A-4147-A177-3AD203B41FA5}">
-                      <a16:colId xmlns="" xmlns:a16="http://schemas.microsoft.com/office/drawing/2014/main" val="20000"/>
+                      <a16:colId xmlns:a16="http://schemas.microsoft.com/office/drawing/2014/main" xmlns="" val="20000"/>
                     </a:ext>
                   </a:extLst>
                 </a:gridCol>
                 <a:gridCol w="1129219">
                   <a:extLst>
                     <a:ext uri="{9D8B030D-6E8A-4147-A177-3AD203B41FA5}">
-                      <a16:colId xmlns="" xmlns:a16="http://schemas.microsoft.com/office/drawing/2014/main" val="20001"/>
+                      <a16:colId xmlns:a16="http://schemas.microsoft.com/office/drawing/2014/main" xmlns="" val="20001"/>
                     </a:ext>
                   </a:extLst>
                 </a:gridCol>
                 <a:gridCol w="1148042">
                   <a:extLst>
                     <a:ext uri="{9D8B030D-6E8A-4147-A177-3AD203B41FA5}">
-                      <a16:colId xmlns="" xmlns:a16="http://schemas.microsoft.com/office/drawing/2014/main" val="20002"/>
+                      <a16:colId xmlns:a16="http://schemas.microsoft.com/office/drawing/2014/main" xmlns="" val="20002"/>
                     </a:ext>
                   </a:extLst>
                 </a:gridCol>
                 <a:gridCol w="802761">
                   <a:extLst>
                     <a:ext uri="{9D8B030D-6E8A-4147-A177-3AD203B41FA5}">
-                      <a16:colId xmlns="" xmlns:a16="http://schemas.microsoft.com/office/drawing/2014/main" val="20003"/>
+                      <a16:colId xmlns:a16="http://schemas.microsoft.com/office/drawing/2014/main" xmlns="" val="20003"/>
                     </a:ext>
                   </a:extLst>
                 </a:gridCol>
                 <a:gridCol w="857259">
                   <a:extLst>
                     <a:ext uri="{9D8B030D-6E8A-4147-A177-3AD203B41FA5}">
-                      <a16:colId xmlns="" xmlns:a16="http://schemas.microsoft.com/office/drawing/2014/main" val="20004"/>
+                      <a16:colId xmlns:a16="http://schemas.microsoft.com/office/drawing/2014/main" xmlns="" val="20004"/>
                     </a:ext>
                   </a:extLst>
                 </a:gridCol>
                 <a:gridCol w="1264838">
                   <a:extLst>
                     <a:ext uri="{9D8B030D-6E8A-4147-A177-3AD203B41FA5}">
-                      <a16:colId xmlns="" xmlns:a16="http://schemas.microsoft.com/office/drawing/2014/main" val="20005"/>
+                      <a16:colId xmlns:a16="http://schemas.microsoft.com/office/drawing/2014/main" xmlns="" val="20005"/>
                     </a:ext>
                   </a:extLst>
                 </a:gridCol>
@@ -31467,7 +31476,7 @@
                 </a:tc>
                 <a:extLst>
                   <a:ext uri="{0D108BD9-81ED-4DB2-BD59-A6C34878D82A}">
-                    <a16:rowId xmlns="" xmlns:a16="http://schemas.microsoft.com/office/drawing/2014/main" val="10000"/>
+                    <a16:rowId xmlns:a16="http://schemas.microsoft.com/office/drawing/2014/main" xmlns="" val="10000"/>
                   </a:ext>
                 </a:extLst>
               </a:tr>
@@ -31565,7 +31574,7 @@
                 </a:tc>
                 <a:extLst>
                   <a:ext uri="{0D108BD9-81ED-4DB2-BD59-A6C34878D82A}">
-                    <a16:rowId xmlns="" xmlns:a16="http://schemas.microsoft.com/office/drawing/2014/main" val="10001"/>
+                    <a16:rowId xmlns:a16="http://schemas.microsoft.com/office/drawing/2014/main" xmlns="" val="10001"/>
                   </a:ext>
                 </a:extLst>
               </a:tr>
@@ -31725,7 +31734,7 @@
                 </a:tc>
                 <a:extLst>
                   <a:ext uri="{0D108BD9-81ED-4DB2-BD59-A6C34878D82A}">
-                    <a16:rowId xmlns="" xmlns:a16="http://schemas.microsoft.com/office/drawing/2014/main" val="10002"/>
+                    <a16:rowId xmlns:a16="http://schemas.microsoft.com/office/drawing/2014/main" xmlns="" val="10002"/>
                   </a:ext>
                 </a:extLst>
               </a:tr>
@@ -31866,7 +31875,7 @@
                 </a:tc>
                 <a:extLst>
                   <a:ext uri="{0D108BD9-81ED-4DB2-BD59-A6C34878D82A}">
-                    <a16:rowId xmlns="" xmlns:a16="http://schemas.microsoft.com/office/drawing/2014/main" val="10003"/>
+                    <a16:rowId xmlns:a16="http://schemas.microsoft.com/office/drawing/2014/main" xmlns="" val="10003"/>
                   </a:ext>
                 </a:extLst>
               </a:tr>
@@ -32009,7 +32018,7 @@
                 </a:tc>
                 <a:extLst>
                   <a:ext uri="{0D108BD9-81ED-4DB2-BD59-A6C34878D82A}">
-                    <a16:rowId xmlns="" xmlns:a16="http://schemas.microsoft.com/office/drawing/2014/main" val="10004"/>
+                    <a16:rowId xmlns:a16="http://schemas.microsoft.com/office/drawing/2014/main" xmlns="" val="10004"/>
                   </a:ext>
                 </a:extLst>
               </a:tr>
@@ -32108,7 +32117,7 @@
                 </a:tc>
                 <a:extLst>
                   <a:ext uri="{0D108BD9-81ED-4DB2-BD59-A6C34878D82A}">
-                    <a16:rowId xmlns="" xmlns:a16="http://schemas.microsoft.com/office/drawing/2014/main" val="10005"/>
+                    <a16:rowId xmlns:a16="http://schemas.microsoft.com/office/drawing/2014/main" xmlns="" val="10005"/>
                   </a:ext>
                 </a:extLst>
               </a:tr>

</xml_diff>